<commit_message>
Added torque-speed characteristic examples.
</commit_message>
<xml_diff>
--- a/ePWT/images/temp.pptx
+++ b/ePWT/images/temp.pptx
@@ -8,6 +8,12 @@
     <p:sldId id="256" r:id="rId3"/>
     <p:sldId id="257" r:id="rId4"/>
     <p:sldId id="258" r:id="rId5"/>
+    <p:sldId id="259" r:id="rId6"/>
+    <p:sldId id="260" r:id="rId7"/>
+    <p:sldId id="261" r:id="rId8"/>
+    <p:sldId id="262" r:id="rId9"/>
+    <p:sldId id="263" r:id="rId10"/>
+    <p:sldId id="264" r:id="rId11"/>
   </p:sldIdLst>
   <p:sldSz cx="12192000" cy="6858000"/>
   <p:notesSz cx="6858000" cy="9144000"/>
@@ -5859,6 +5865,2478 @@
 </p:sld>
 </file>
 
+<file path=ppt/slides/slide4.xml><?xml version="1.0" encoding="utf-8"?>
+<p:sld xmlns:a="http://schemas.openxmlformats.org/drawingml/2006/main" xmlns:r="http://schemas.openxmlformats.org/officeDocument/2006/relationships" xmlns:p="http://schemas.openxmlformats.org/presentationml/2006/main">
+  <p:cSld>
+    <p:spTree>
+      <p:nvGrpSpPr>
+        <p:cNvPr id="1" name=""/>
+        <p:cNvGrpSpPr/>
+        <p:nvPr/>
+      </p:nvGrpSpPr>
+      <p:grpSpPr/>
+      <p:pic>
+        <p:nvPicPr>
+          <p:cNvPr id="5" name="Picture 4"/>
+          <p:cNvPicPr>
+            <a:picLocks noChangeAspect="1"/>
+          </p:cNvPicPr>
+          <p:nvPr/>
+        </p:nvPicPr>
+        <p:blipFill>
+          <a:blip r:embed="rId1"/>
+          <a:stretch>
+            <a:fillRect/>
+          </a:stretch>
+        </p:blipFill>
+        <p:spPr>
+          <a:xfrm>
+            <a:off x="2552700" y="1785620"/>
+            <a:ext cx="6700520" cy="4028440"/>
+          </a:xfrm>
+          <a:prstGeom prst="rect">
+            <a:avLst/>
+          </a:prstGeom>
+        </p:spPr>
+      </p:pic>
+      <p:sp>
+        <p:nvSpPr>
+          <p:cNvPr id="36" name="Text Box 35"/>
+          <p:cNvSpPr txBox="1"/>
+          <p:nvPr/>
+        </p:nvSpPr>
+        <p:spPr>
+          <a:xfrm>
+            <a:off x="7677785" y="2733040"/>
+            <a:ext cx="2894965" cy="368300"/>
+          </a:xfrm>
+          <a:prstGeom prst="rect">
+            <a:avLst/>
+          </a:prstGeom>
+          <a:noFill/>
+        </p:spPr>
+        <p:txBody>
+          <a:bodyPr wrap="square" rtlCol="0">
+            <a:spAutoFit/>
+          </a:bodyPr>
+          <a:p>
+            <a:pPr algn="l"/>
+            <a:r>
+              <a:rPr lang="en-US" b="1">
+                <a:solidFill>
+                  <a:schemeClr val="accent5"/>
+                </a:solidFill>
+              </a:rPr>
+              <a:t>T</a:t>
+            </a:r>
+            <a:r>
+              <a:rPr lang="en-US" b="1" baseline="-25000">
+                <a:solidFill>
+                  <a:schemeClr val="accent5"/>
+                </a:solidFill>
+              </a:rPr>
+              <a:t>out</a:t>
+            </a:r>
+            <a:r>
+              <a:rPr lang="en-US" b="1">
+                <a:solidFill>
+                  <a:schemeClr val="accent5"/>
+                </a:solidFill>
+              </a:rPr>
+              <a:t> &amp; w</a:t>
+            </a:r>
+            <a:r>
+              <a:rPr lang="en-US" b="1" baseline="-25000">
+                <a:solidFill>
+                  <a:schemeClr val="accent5"/>
+                </a:solidFill>
+              </a:rPr>
+              <a:t>out</a:t>
+            </a:r>
+            <a:endParaRPr lang="en-US" b="1" baseline="-25000">
+              <a:solidFill>
+                <a:schemeClr val="accent5"/>
+              </a:solidFill>
+            </a:endParaRPr>
+          </a:p>
+        </p:txBody>
+      </p:sp>
+      <p:sp>
+        <p:nvSpPr>
+          <p:cNvPr id="6" name="Text Box 5"/>
+          <p:cNvSpPr txBox="1"/>
+          <p:nvPr/>
+        </p:nvSpPr>
+        <p:spPr>
+          <a:xfrm>
+            <a:off x="6205855" y="3196590"/>
+            <a:ext cx="2894965" cy="368300"/>
+          </a:xfrm>
+          <a:prstGeom prst="rect">
+            <a:avLst/>
+          </a:prstGeom>
+          <a:noFill/>
+        </p:spPr>
+        <p:txBody>
+          <a:bodyPr wrap="square" rtlCol="0">
+            <a:spAutoFit/>
+          </a:bodyPr>
+          <a:p>
+            <a:pPr algn="l"/>
+            <a:r>
+              <a:rPr lang="en-US" b="1">
+                <a:solidFill>
+                  <a:srgbClr val="FF0000"/>
+                </a:solidFill>
+              </a:rPr>
+              <a:t>T</a:t>
+            </a:r>
+            <a:r>
+              <a:rPr lang="en-US" b="1" baseline="-25000">
+                <a:solidFill>
+                  <a:srgbClr val="FF0000"/>
+                </a:solidFill>
+              </a:rPr>
+              <a:t>in</a:t>
+            </a:r>
+            <a:r>
+              <a:rPr lang="en-US" b="1">
+                <a:solidFill>
+                  <a:srgbClr val="FF0000"/>
+                </a:solidFill>
+              </a:rPr>
+              <a:t> &amp; w</a:t>
+            </a:r>
+            <a:r>
+              <a:rPr lang="en-US" b="1" baseline="-25000">
+                <a:solidFill>
+                  <a:srgbClr val="FF0000"/>
+                </a:solidFill>
+              </a:rPr>
+              <a:t>in</a:t>
+            </a:r>
+            <a:endParaRPr lang="en-US" b="1" baseline="-25000">
+              <a:solidFill>
+                <a:srgbClr val="FF0000"/>
+              </a:solidFill>
+            </a:endParaRPr>
+          </a:p>
+        </p:txBody>
+      </p:sp>
+    </p:spTree>
+  </p:cSld>
+  <p:clrMapOvr>
+    <a:masterClrMapping/>
+  </p:clrMapOvr>
+</p:sld>
+</file>
+
+<file path=ppt/slides/slide5.xml><?xml version="1.0" encoding="utf-8"?>
+<p:sld xmlns:a="http://schemas.openxmlformats.org/drawingml/2006/main" xmlns:r="http://schemas.openxmlformats.org/officeDocument/2006/relationships" xmlns:p="http://schemas.openxmlformats.org/presentationml/2006/main">
+  <p:cSld>
+    <p:spTree>
+      <p:nvGrpSpPr>
+        <p:cNvPr id="1" name=""/>
+        <p:cNvGrpSpPr/>
+        <p:nvPr/>
+      </p:nvGrpSpPr>
+      <p:grpSpPr/>
+      <p:cxnSp>
+        <p:nvCxnSpPr>
+          <p:cNvPr id="4" name="Straight Connector 3"/>
+          <p:cNvCxnSpPr/>
+          <p:nvPr/>
+        </p:nvCxnSpPr>
+        <p:spPr>
+          <a:xfrm>
+            <a:off x="1596390" y="805180"/>
+            <a:ext cx="0" cy="5219700"/>
+          </a:xfrm>
+          <a:prstGeom prst="line">
+            <a:avLst/>
+          </a:prstGeom>
+          <a:ln>
+            <a:solidFill>
+              <a:schemeClr val="tx1"/>
+            </a:solidFill>
+          </a:ln>
+        </p:spPr>
+        <p:style>
+          <a:lnRef idx="3">
+            <a:schemeClr val="accent1"/>
+          </a:lnRef>
+          <a:fillRef idx="0">
+            <a:schemeClr val="accent1"/>
+          </a:fillRef>
+          <a:effectRef idx="2">
+            <a:schemeClr val="accent1"/>
+          </a:effectRef>
+          <a:fontRef idx="minor">
+            <a:schemeClr val="tx1"/>
+          </a:fontRef>
+        </p:style>
+      </p:cxnSp>
+      <p:cxnSp>
+        <p:nvCxnSpPr>
+          <p:cNvPr id="5" name="Straight Connector 4"/>
+          <p:cNvCxnSpPr/>
+          <p:nvPr/>
+        </p:nvCxnSpPr>
+        <p:spPr>
+          <a:xfrm flipH="1">
+            <a:off x="1179195" y="1932305"/>
+            <a:ext cx="8369300" cy="8890"/>
+          </a:xfrm>
+          <a:prstGeom prst="line">
+            <a:avLst/>
+          </a:prstGeom>
+          <a:ln>
+            <a:solidFill>
+              <a:schemeClr val="tx1"/>
+            </a:solidFill>
+          </a:ln>
+        </p:spPr>
+        <p:style>
+          <a:lnRef idx="3">
+            <a:schemeClr val="accent1"/>
+          </a:lnRef>
+          <a:fillRef idx="0">
+            <a:schemeClr val="accent1"/>
+          </a:fillRef>
+          <a:effectRef idx="2">
+            <a:schemeClr val="accent1"/>
+          </a:effectRef>
+          <a:fontRef idx="minor">
+            <a:schemeClr val="tx1"/>
+          </a:fontRef>
+        </p:style>
+      </p:cxnSp>
+      <p:cxnSp>
+        <p:nvCxnSpPr>
+          <p:cNvPr id="6" name="Straight Connector 5"/>
+          <p:cNvCxnSpPr/>
+          <p:nvPr/>
+        </p:nvCxnSpPr>
+        <p:spPr>
+          <a:xfrm flipH="1">
+            <a:off x="1143000" y="3385185"/>
+            <a:ext cx="8369300" cy="8890"/>
+          </a:xfrm>
+          <a:prstGeom prst="line">
+            <a:avLst/>
+          </a:prstGeom>
+          <a:ln>
+            <a:solidFill>
+              <a:schemeClr val="tx1"/>
+            </a:solidFill>
+          </a:ln>
+        </p:spPr>
+        <p:style>
+          <a:lnRef idx="3">
+            <a:schemeClr val="accent1"/>
+          </a:lnRef>
+          <a:fillRef idx="0">
+            <a:schemeClr val="accent1"/>
+          </a:fillRef>
+          <a:effectRef idx="2">
+            <a:schemeClr val="accent1"/>
+          </a:effectRef>
+          <a:fontRef idx="minor">
+            <a:schemeClr val="tx1"/>
+          </a:fontRef>
+        </p:style>
+      </p:cxnSp>
+      <p:cxnSp>
+        <p:nvCxnSpPr>
+          <p:cNvPr id="7" name="Straight Connector 6"/>
+          <p:cNvCxnSpPr/>
+          <p:nvPr/>
+        </p:nvCxnSpPr>
+        <p:spPr>
+          <a:xfrm flipH="1">
+            <a:off x="1179195" y="5485765"/>
+            <a:ext cx="8369300" cy="8890"/>
+          </a:xfrm>
+          <a:prstGeom prst="line">
+            <a:avLst/>
+          </a:prstGeom>
+          <a:ln>
+            <a:solidFill>
+              <a:schemeClr val="tx1"/>
+            </a:solidFill>
+          </a:ln>
+        </p:spPr>
+        <p:style>
+          <a:lnRef idx="3">
+            <a:schemeClr val="accent1"/>
+          </a:lnRef>
+          <a:fillRef idx="0">
+            <a:schemeClr val="accent1"/>
+          </a:fillRef>
+          <a:effectRef idx="2">
+            <a:schemeClr val="accent1"/>
+          </a:effectRef>
+          <a:fontRef idx="minor">
+            <a:schemeClr val="tx1"/>
+          </a:fontRef>
+        </p:style>
+      </p:cxnSp>
+      <p:cxnSp>
+        <p:nvCxnSpPr>
+          <p:cNvPr id="9" name="Straight Connector 8"/>
+          <p:cNvCxnSpPr/>
+          <p:nvPr/>
+        </p:nvCxnSpPr>
+        <p:spPr>
+          <a:xfrm flipH="1">
+            <a:off x="3475990" y="443230"/>
+            <a:ext cx="17780" cy="5562600"/>
+          </a:xfrm>
+          <a:prstGeom prst="line">
+            <a:avLst/>
+          </a:prstGeom>
+          <a:ln w="28575" cmpd="sng">
+            <a:solidFill>
+              <a:schemeClr val="accent1">
+                <a:shade val="50000"/>
+              </a:schemeClr>
+            </a:solidFill>
+            <a:prstDash val="sysDot"/>
+          </a:ln>
+        </p:spPr>
+        <p:style>
+          <a:lnRef idx="3">
+            <a:schemeClr val="accent1"/>
+          </a:lnRef>
+          <a:fillRef idx="0">
+            <a:schemeClr val="accent1"/>
+          </a:fillRef>
+          <a:effectRef idx="2">
+            <a:schemeClr val="accent1"/>
+          </a:effectRef>
+          <a:fontRef idx="minor">
+            <a:schemeClr val="tx1"/>
+          </a:fontRef>
+        </p:style>
+      </p:cxnSp>
+      <p:cxnSp>
+        <p:nvCxnSpPr>
+          <p:cNvPr id="10" name="Straight Connector 9"/>
+          <p:cNvCxnSpPr/>
+          <p:nvPr/>
+        </p:nvCxnSpPr>
+        <p:spPr>
+          <a:xfrm>
+            <a:off x="5327650" y="443230"/>
+            <a:ext cx="0" cy="5543550"/>
+          </a:xfrm>
+          <a:prstGeom prst="line">
+            <a:avLst/>
+          </a:prstGeom>
+          <a:ln w="28575" cmpd="sng">
+            <a:solidFill>
+              <a:schemeClr val="accent1">
+                <a:shade val="50000"/>
+              </a:schemeClr>
+            </a:solidFill>
+            <a:prstDash val="sysDot"/>
+          </a:ln>
+        </p:spPr>
+        <p:style>
+          <a:lnRef idx="3">
+            <a:schemeClr val="accent1"/>
+          </a:lnRef>
+          <a:fillRef idx="0">
+            <a:schemeClr val="accent1"/>
+          </a:fillRef>
+          <a:effectRef idx="2">
+            <a:schemeClr val="accent1"/>
+          </a:effectRef>
+          <a:fontRef idx="minor">
+            <a:schemeClr val="tx1"/>
+          </a:fontRef>
+        </p:style>
+      </p:cxnSp>
+      <p:cxnSp>
+        <p:nvCxnSpPr>
+          <p:cNvPr id="11" name="Straight Connector 10"/>
+          <p:cNvCxnSpPr/>
+          <p:nvPr/>
+        </p:nvCxnSpPr>
+        <p:spPr>
+          <a:xfrm>
+            <a:off x="7251700" y="481330"/>
+            <a:ext cx="0" cy="5486400"/>
+          </a:xfrm>
+          <a:prstGeom prst="line">
+            <a:avLst/>
+          </a:prstGeom>
+          <a:ln w="28575" cmpd="sng">
+            <a:solidFill>
+              <a:schemeClr val="accent1">
+                <a:shade val="50000"/>
+              </a:schemeClr>
+            </a:solidFill>
+            <a:prstDash val="sysDot"/>
+          </a:ln>
+        </p:spPr>
+        <p:style>
+          <a:lnRef idx="3">
+            <a:schemeClr val="accent1"/>
+          </a:lnRef>
+          <a:fillRef idx="0">
+            <a:schemeClr val="accent1"/>
+          </a:fillRef>
+          <a:effectRef idx="2">
+            <a:schemeClr val="accent1"/>
+          </a:effectRef>
+          <a:fontRef idx="minor">
+            <a:schemeClr val="tx1"/>
+          </a:fontRef>
+        </p:style>
+      </p:cxnSp>
+      <p:cxnSp>
+        <p:nvCxnSpPr>
+          <p:cNvPr id="13" name="Straight Connector 12"/>
+          <p:cNvCxnSpPr/>
+          <p:nvPr/>
+        </p:nvCxnSpPr>
+        <p:spPr>
+          <a:xfrm flipV="1">
+            <a:off x="1580515" y="957580"/>
+            <a:ext cx="1929130" cy="990600"/>
+          </a:xfrm>
+          <a:prstGeom prst="line">
+            <a:avLst/>
+          </a:prstGeom>
+          <a:ln w="28575" cmpd="sng">
+            <a:solidFill>
+              <a:schemeClr val="accent1">
+                <a:shade val="50000"/>
+              </a:schemeClr>
+            </a:solidFill>
+            <a:prstDash val="solid"/>
+          </a:ln>
+        </p:spPr>
+        <p:style>
+          <a:lnRef idx="1">
+            <a:schemeClr val="accent1"/>
+          </a:lnRef>
+          <a:fillRef idx="0">
+            <a:schemeClr val="accent1"/>
+          </a:fillRef>
+          <a:effectRef idx="0">
+            <a:schemeClr val="accent1"/>
+          </a:effectRef>
+          <a:fontRef idx="minor">
+            <a:schemeClr val="tx1"/>
+          </a:fontRef>
+        </p:style>
+      </p:cxnSp>
+      <p:cxnSp>
+        <p:nvCxnSpPr>
+          <p:cNvPr id="14" name="Straight Connector 13"/>
+          <p:cNvCxnSpPr/>
+          <p:nvPr/>
+        </p:nvCxnSpPr>
+        <p:spPr>
+          <a:xfrm>
+            <a:off x="3493770" y="976630"/>
+            <a:ext cx="1830070" cy="0"/>
+          </a:xfrm>
+          <a:prstGeom prst="line">
+            <a:avLst/>
+          </a:prstGeom>
+          <a:ln w="28575" cmpd="sng">
+            <a:solidFill>
+              <a:schemeClr val="accent1">
+                <a:shade val="50000"/>
+              </a:schemeClr>
+            </a:solidFill>
+            <a:prstDash val="solid"/>
+          </a:ln>
+        </p:spPr>
+        <p:style>
+          <a:lnRef idx="1">
+            <a:schemeClr val="accent1"/>
+          </a:lnRef>
+          <a:fillRef idx="0">
+            <a:schemeClr val="accent1"/>
+          </a:fillRef>
+          <a:effectRef idx="0">
+            <a:schemeClr val="accent1"/>
+          </a:effectRef>
+          <a:fontRef idx="minor">
+            <a:schemeClr val="tx1"/>
+          </a:fontRef>
+        </p:style>
+      </p:cxnSp>
+      <p:cxnSp>
+        <p:nvCxnSpPr>
+          <p:cNvPr id="15" name="Straight Connector 14"/>
+          <p:cNvCxnSpPr/>
+          <p:nvPr/>
+        </p:nvCxnSpPr>
+        <p:spPr>
+          <a:xfrm>
+            <a:off x="5297170" y="977265"/>
+            <a:ext cx="1962785" cy="937895"/>
+          </a:xfrm>
+          <a:prstGeom prst="line">
+            <a:avLst/>
+          </a:prstGeom>
+          <a:ln w="28575" cmpd="sng">
+            <a:solidFill>
+              <a:schemeClr val="accent1">
+                <a:shade val="50000"/>
+              </a:schemeClr>
+            </a:solidFill>
+            <a:prstDash val="solid"/>
+          </a:ln>
+        </p:spPr>
+        <p:style>
+          <a:lnRef idx="1">
+            <a:schemeClr val="accent1"/>
+          </a:lnRef>
+          <a:fillRef idx="0">
+            <a:schemeClr val="accent1"/>
+          </a:fillRef>
+          <a:effectRef idx="0">
+            <a:schemeClr val="accent1"/>
+          </a:effectRef>
+          <a:fontRef idx="minor">
+            <a:schemeClr val="tx1"/>
+          </a:fontRef>
+        </p:style>
+      </p:cxnSp>
+      <p:cxnSp>
+        <p:nvCxnSpPr>
+          <p:cNvPr id="16" name="Straight Connector 15"/>
+          <p:cNvCxnSpPr/>
+          <p:nvPr/>
+        </p:nvCxnSpPr>
+        <p:spPr>
+          <a:xfrm>
+            <a:off x="7259955" y="1941195"/>
+            <a:ext cx="1830070" cy="0"/>
+          </a:xfrm>
+          <a:prstGeom prst="line">
+            <a:avLst/>
+          </a:prstGeom>
+          <a:ln w="28575" cmpd="sng">
+            <a:solidFill>
+              <a:schemeClr val="accent1">
+                <a:shade val="50000"/>
+              </a:schemeClr>
+            </a:solidFill>
+            <a:prstDash val="solid"/>
+          </a:ln>
+        </p:spPr>
+        <p:style>
+          <a:lnRef idx="1">
+            <a:schemeClr val="accent1"/>
+          </a:lnRef>
+          <a:fillRef idx="0">
+            <a:schemeClr val="accent1"/>
+          </a:fillRef>
+          <a:effectRef idx="0">
+            <a:schemeClr val="accent1"/>
+          </a:effectRef>
+          <a:fontRef idx="minor">
+            <a:schemeClr val="tx1"/>
+          </a:fontRef>
+        </p:style>
+      </p:cxnSp>
+      <p:sp>
+        <p:nvSpPr>
+          <p:cNvPr id="49" name="Text Box 48"/>
+          <p:cNvSpPr txBox="1"/>
+          <p:nvPr/>
+        </p:nvSpPr>
+        <p:spPr>
+          <a:xfrm>
+            <a:off x="437515" y="792480"/>
+            <a:ext cx="1162050" cy="368300"/>
+          </a:xfrm>
+          <a:prstGeom prst="rect">
+            <a:avLst/>
+          </a:prstGeom>
+          <a:noFill/>
+        </p:spPr>
+        <p:txBody>
+          <a:bodyPr wrap="square" rtlCol="0">
+            <a:spAutoFit/>
+          </a:bodyPr>
+          <a:p>
+            <a:pPr algn="r"/>
+            <a:r>
+              <a:rPr lang="en-US" b="1">
+                <a:solidFill>
+                  <a:schemeClr val="accent5">
+                    <a:lumMod val="75000"/>
+                  </a:schemeClr>
+                </a:solidFill>
+              </a:rPr>
+              <a:t>25m/s</a:t>
+            </a:r>
+            <a:endParaRPr lang="en-US" b="1" baseline="-25000">
+              <a:solidFill>
+                <a:schemeClr val="accent5">
+                  <a:lumMod val="75000"/>
+                </a:schemeClr>
+              </a:solidFill>
+            </a:endParaRPr>
+          </a:p>
+        </p:txBody>
+      </p:sp>
+      <p:sp>
+        <p:nvSpPr>
+          <p:cNvPr id="17" name="Text Box 16"/>
+          <p:cNvSpPr txBox="1"/>
+          <p:nvPr/>
+        </p:nvSpPr>
+        <p:spPr>
+          <a:xfrm>
+            <a:off x="9548495" y="1752600"/>
+            <a:ext cx="1162050" cy="368300"/>
+          </a:xfrm>
+          <a:prstGeom prst="rect">
+            <a:avLst/>
+          </a:prstGeom>
+          <a:noFill/>
+        </p:spPr>
+        <p:txBody>
+          <a:bodyPr wrap="square" rtlCol="0">
+            <a:spAutoFit/>
+          </a:bodyPr>
+          <a:p>
+            <a:pPr algn="l"/>
+            <a:r>
+              <a:rPr lang="en-US" b="1">
+                <a:solidFill>
+                  <a:schemeClr val="tx1"/>
+                </a:solidFill>
+              </a:rPr>
+              <a:t>t</a:t>
+            </a:r>
+            <a:endParaRPr lang="en-US" b="1" baseline="-25000">
+              <a:solidFill>
+                <a:schemeClr val="tx1"/>
+              </a:solidFill>
+            </a:endParaRPr>
+          </a:p>
+        </p:txBody>
+      </p:sp>
+      <p:sp>
+        <p:nvSpPr>
+          <p:cNvPr id="18" name="Text Box 17"/>
+          <p:cNvSpPr txBox="1"/>
+          <p:nvPr/>
+        </p:nvSpPr>
+        <p:spPr>
+          <a:xfrm>
+            <a:off x="9548495" y="3219450"/>
+            <a:ext cx="1162050" cy="368300"/>
+          </a:xfrm>
+          <a:prstGeom prst="rect">
+            <a:avLst/>
+          </a:prstGeom>
+          <a:noFill/>
+        </p:spPr>
+        <p:txBody>
+          <a:bodyPr wrap="square" rtlCol="0">
+            <a:spAutoFit/>
+          </a:bodyPr>
+          <a:p>
+            <a:pPr algn="l"/>
+            <a:r>
+              <a:rPr lang="en-US" b="1">
+                <a:solidFill>
+                  <a:schemeClr val="tx1"/>
+                </a:solidFill>
+              </a:rPr>
+              <a:t>t</a:t>
+            </a:r>
+            <a:endParaRPr lang="en-US" b="1" baseline="-25000">
+              <a:solidFill>
+                <a:schemeClr val="tx1"/>
+              </a:solidFill>
+            </a:endParaRPr>
+          </a:p>
+        </p:txBody>
+      </p:sp>
+      <p:sp>
+        <p:nvSpPr>
+          <p:cNvPr id="19" name="Text Box 18"/>
+          <p:cNvSpPr txBox="1"/>
+          <p:nvPr/>
+        </p:nvSpPr>
+        <p:spPr>
+          <a:xfrm>
+            <a:off x="9548495" y="5334000"/>
+            <a:ext cx="1162050" cy="368300"/>
+          </a:xfrm>
+          <a:prstGeom prst="rect">
+            <a:avLst/>
+          </a:prstGeom>
+          <a:noFill/>
+        </p:spPr>
+        <p:txBody>
+          <a:bodyPr wrap="square" rtlCol="0">
+            <a:spAutoFit/>
+          </a:bodyPr>
+          <a:p>
+            <a:pPr algn="l"/>
+            <a:r>
+              <a:rPr lang="en-US" b="1">
+                <a:solidFill>
+                  <a:schemeClr val="tx1"/>
+                </a:solidFill>
+              </a:rPr>
+              <a:t>t</a:t>
+            </a:r>
+            <a:endParaRPr lang="en-US" b="1" baseline="-25000">
+              <a:solidFill>
+                <a:schemeClr val="tx1"/>
+              </a:solidFill>
+            </a:endParaRPr>
+          </a:p>
+        </p:txBody>
+      </p:sp>
+      <p:sp>
+        <p:nvSpPr>
+          <p:cNvPr id="20" name="Text Box 19"/>
+          <p:cNvSpPr txBox="1"/>
+          <p:nvPr/>
+        </p:nvSpPr>
+        <p:spPr>
+          <a:xfrm>
+            <a:off x="9548495" y="1421130"/>
+            <a:ext cx="2018665" cy="368300"/>
+          </a:xfrm>
+          <a:prstGeom prst="rect">
+            <a:avLst/>
+          </a:prstGeom>
+          <a:noFill/>
+        </p:spPr>
+        <p:txBody>
+          <a:bodyPr wrap="square" rtlCol="0">
+            <a:spAutoFit/>
+          </a:bodyPr>
+          <a:p>
+            <a:pPr algn="l"/>
+            <a:r>
+              <a:rPr lang="en-US" b="1">
+                <a:solidFill>
+                  <a:schemeClr val="accent5">
+                    <a:lumMod val="75000"/>
+                  </a:schemeClr>
+                </a:solidFill>
+              </a:rPr>
+              <a:t>speed [m/s]</a:t>
+            </a:r>
+            <a:endParaRPr lang="en-US" b="1" baseline="-25000">
+              <a:solidFill>
+                <a:schemeClr val="accent5">
+                  <a:lumMod val="75000"/>
+                </a:schemeClr>
+              </a:solidFill>
+            </a:endParaRPr>
+          </a:p>
+        </p:txBody>
+      </p:sp>
+      <p:sp>
+        <p:nvSpPr>
+          <p:cNvPr id="21" name="Text Box 20"/>
+          <p:cNvSpPr txBox="1"/>
+          <p:nvPr/>
+        </p:nvSpPr>
+        <p:spPr>
+          <a:xfrm>
+            <a:off x="437515" y="2316480"/>
+            <a:ext cx="1162050" cy="368300"/>
+          </a:xfrm>
+          <a:prstGeom prst="rect">
+            <a:avLst/>
+          </a:prstGeom>
+          <a:noFill/>
+        </p:spPr>
+        <p:txBody>
+          <a:bodyPr wrap="square" rtlCol="0">
+            <a:spAutoFit/>
+          </a:bodyPr>
+          <a:p>
+            <a:pPr algn="r"/>
+            <a:r>
+              <a:rPr lang="en-US" b="1">
+                <a:solidFill>
+                  <a:schemeClr val="accent5">
+                    <a:lumMod val="75000"/>
+                  </a:schemeClr>
+                </a:solidFill>
+              </a:rPr>
+              <a:t>2.5</a:t>
+            </a:r>
+            <a:endParaRPr lang="en-US" b="1" baseline="-25000">
+              <a:solidFill>
+                <a:schemeClr val="accent5">
+                  <a:lumMod val="75000"/>
+                </a:schemeClr>
+              </a:solidFill>
+            </a:endParaRPr>
+          </a:p>
+        </p:txBody>
+      </p:sp>
+      <p:cxnSp>
+        <p:nvCxnSpPr>
+          <p:cNvPr id="22" name="Straight Connector 21"/>
+          <p:cNvCxnSpPr/>
+          <p:nvPr/>
+        </p:nvCxnSpPr>
+        <p:spPr>
+          <a:xfrm>
+            <a:off x="1571625" y="2500630"/>
+            <a:ext cx="1898650" cy="0"/>
+          </a:xfrm>
+          <a:prstGeom prst="line">
+            <a:avLst/>
+          </a:prstGeom>
+          <a:ln w="28575" cmpd="sng">
+            <a:solidFill>
+              <a:schemeClr val="accent1">
+                <a:shade val="50000"/>
+              </a:schemeClr>
+            </a:solidFill>
+            <a:prstDash val="solid"/>
+          </a:ln>
+        </p:spPr>
+        <p:style>
+          <a:lnRef idx="1">
+            <a:schemeClr val="accent1"/>
+          </a:lnRef>
+          <a:fillRef idx="0">
+            <a:schemeClr val="accent1"/>
+          </a:fillRef>
+          <a:effectRef idx="0">
+            <a:schemeClr val="accent1"/>
+          </a:effectRef>
+          <a:fontRef idx="minor">
+            <a:schemeClr val="tx1"/>
+          </a:fontRef>
+        </p:style>
+      </p:cxnSp>
+      <p:cxnSp>
+        <p:nvCxnSpPr>
+          <p:cNvPr id="23" name="Straight Connector 22"/>
+          <p:cNvCxnSpPr/>
+          <p:nvPr/>
+        </p:nvCxnSpPr>
+        <p:spPr>
+          <a:xfrm>
+            <a:off x="3492500" y="2506345"/>
+            <a:ext cx="0" cy="904875"/>
+          </a:xfrm>
+          <a:prstGeom prst="line">
+            <a:avLst/>
+          </a:prstGeom>
+          <a:ln w="28575" cmpd="sng">
+            <a:solidFill>
+              <a:schemeClr val="accent1">
+                <a:shade val="50000"/>
+              </a:schemeClr>
+            </a:solidFill>
+            <a:prstDash val="solid"/>
+          </a:ln>
+        </p:spPr>
+        <p:style>
+          <a:lnRef idx="1">
+            <a:schemeClr val="accent1"/>
+          </a:lnRef>
+          <a:fillRef idx="0">
+            <a:schemeClr val="accent1"/>
+          </a:fillRef>
+          <a:effectRef idx="0">
+            <a:schemeClr val="accent1"/>
+          </a:effectRef>
+          <a:fontRef idx="minor">
+            <a:schemeClr val="tx1"/>
+          </a:fontRef>
+        </p:style>
+      </p:cxnSp>
+      <p:cxnSp>
+        <p:nvCxnSpPr>
+          <p:cNvPr id="24" name="Straight Connector 23"/>
+          <p:cNvCxnSpPr/>
+          <p:nvPr/>
+        </p:nvCxnSpPr>
+        <p:spPr>
+          <a:xfrm>
+            <a:off x="3484245" y="3389630"/>
+            <a:ext cx="1898650" cy="0"/>
+          </a:xfrm>
+          <a:prstGeom prst="line">
+            <a:avLst/>
+          </a:prstGeom>
+          <a:ln w="28575" cmpd="sng">
+            <a:solidFill>
+              <a:schemeClr val="accent1">
+                <a:shade val="50000"/>
+              </a:schemeClr>
+            </a:solidFill>
+            <a:prstDash val="solid"/>
+          </a:ln>
+        </p:spPr>
+        <p:style>
+          <a:lnRef idx="1">
+            <a:schemeClr val="accent1"/>
+          </a:lnRef>
+          <a:fillRef idx="0">
+            <a:schemeClr val="accent1"/>
+          </a:fillRef>
+          <a:effectRef idx="0">
+            <a:schemeClr val="accent1"/>
+          </a:effectRef>
+          <a:fontRef idx="minor">
+            <a:schemeClr val="tx1"/>
+          </a:fontRef>
+        </p:style>
+      </p:cxnSp>
+      <p:cxnSp>
+        <p:nvCxnSpPr>
+          <p:cNvPr id="25" name="Straight Connector 24"/>
+          <p:cNvCxnSpPr/>
+          <p:nvPr/>
+        </p:nvCxnSpPr>
+        <p:spPr>
+          <a:xfrm>
+            <a:off x="5331460" y="3385185"/>
+            <a:ext cx="0" cy="904875"/>
+          </a:xfrm>
+          <a:prstGeom prst="line">
+            <a:avLst/>
+          </a:prstGeom>
+          <a:ln w="28575" cmpd="sng">
+            <a:solidFill>
+              <a:schemeClr val="accent1">
+                <a:shade val="50000"/>
+              </a:schemeClr>
+            </a:solidFill>
+            <a:prstDash val="solid"/>
+          </a:ln>
+        </p:spPr>
+        <p:style>
+          <a:lnRef idx="1">
+            <a:schemeClr val="accent1"/>
+          </a:lnRef>
+          <a:fillRef idx="0">
+            <a:schemeClr val="accent1"/>
+          </a:fillRef>
+          <a:effectRef idx="0">
+            <a:schemeClr val="accent1"/>
+          </a:effectRef>
+          <a:fontRef idx="minor">
+            <a:schemeClr val="tx1"/>
+          </a:fontRef>
+        </p:style>
+      </p:cxnSp>
+      <p:cxnSp>
+        <p:nvCxnSpPr>
+          <p:cNvPr id="26" name="Straight Connector 25"/>
+          <p:cNvCxnSpPr/>
+          <p:nvPr/>
+        </p:nvCxnSpPr>
+        <p:spPr>
+          <a:xfrm>
+            <a:off x="5330825" y="4278630"/>
+            <a:ext cx="1898650" cy="0"/>
+          </a:xfrm>
+          <a:prstGeom prst="line">
+            <a:avLst/>
+          </a:prstGeom>
+          <a:ln w="28575" cmpd="sng">
+            <a:solidFill>
+              <a:schemeClr val="accent1">
+                <a:shade val="50000"/>
+              </a:schemeClr>
+            </a:solidFill>
+            <a:prstDash val="solid"/>
+          </a:ln>
+        </p:spPr>
+        <p:style>
+          <a:lnRef idx="1">
+            <a:schemeClr val="accent1"/>
+          </a:lnRef>
+          <a:fillRef idx="0">
+            <a:schemeClr val="accent1"/>
+          </a:fillRef>
+          <a:effectRef idx="0">
+            <a:schemeClr val="accent1"/>
+          </a:effectRef>
+          <a:fontRef idx="minor">
+            <a:schemeClr val="tx1"/>
+          </a:fontRef>
+        </p:style>
+      </p:cxnSp>
+      <p:cxnSp>
+        <p:nvCxnSpPr>
+          <p:cNvPr id="27" name="Straight Connector 26"/>
+          <p:cNvCxnSpPr/>
+          <p:nvPr/>
+        </p:nvCxnSpPr>
+        <p:spPr>
+          <a:xfrm>
+            <a:off x="7253605" y="3394075"/>
+            <a:ext cx="0" cy="904875"/>
+          </a:xfrm>
+          <a:prstGeom prst="line">
+            <a:avLst/>
+          </a:prstGeom>
+          <a:ln w="28575" cmpd="sng">
+            <a:solidFill>
+              <a:schemeClr val="accent1">
+                <a:shade val="50000"/>
+              </a:schemeClr>
+            </a:solidFill>
+            <a:prstDash val="solid"/>
+          </a:ln>
+        </p:spPr>
+        <p:style>
+          <a:lnRef idx="1">
+            <a:schemeClr val="accent1"/>
+          </a:lnRef>
+          <a:fillRef idx="0">
+            <a:schemeClr val="accent1"/>
+          </a:fillRef>
+          <a:effectRef idx="0">
+            <a:schemeClr val="accent1"/>
+          </a:effectRef>
+          <a:fontRef idx="minor">
+            <a:schemeClr val="tx1"/>
+          </a:fontRef>
+        </p:style>
+      </p:cxnSp>
+      <p:cxnSp>
+        <p:nvCxnSpPr>
+          <p:cNvPr id="28" name="Straight Connector 27"/>
+          <p:cNvCxnSpPr/>
+          <p:nvPr/>
+        </p:nvCxnSpPr>
+        <p:spPr>
+          <a:xfrm>
+            <a:off x="7218045" y="3389630"/>
+            <a:ext cx="1898650" cy="0"/>
+          </a:xfrm>
+          <a:prstGeom prst="line">
+            <a:avLst/>
+          </a:prstGeom>
+          <a:ln w="28575" cmpd="sng">
+            <a:solidFill>
+              <a:schemeClr val="accent1">
+                <a:shade val="50000"/>
+              </a:schemeClr>
+            </a:solidFill>
+            <a:prstDash val="solid"/>
+          </a:ln>
+        </p:spPr>
+        <p:style>
+          <a:lnRef idx="1">
+            <a:schemeClr val="accent1"/>
+          </a:lnRef>
+          <a:fillRef idx="0">
+            <a:schemeClr val="accent1"/>
+          </a:fillRef>
+          <a:effectRef idx="0">
+            <a:schemeClr val="accent1"/>
+          </a:effectRef>
+          <a:fontRef idx="minor">
+            <a:schemeClr val="tx1"/>
+          </a:fontRef>
+        </p:style>
+      </p:cxnSp>
+      <p:sp>
+        <p:nvSpPr>
+          <p:cNvPr id="29" name="Text Box 28"/>
+          <p:cNvSpPr txBox="1"/>
+          <p:nvPr/>
+        </p:nvSpPr>
+        <p:spPr>
+          <a:xfrm>
+            <a:off x="9548495" y="2907665"/>
+            <a:ext cx="2018665" cy="368300"/>
+          </a:xfrm>
+          <a:prstGeom prst="rect">
+            <a:avLst/>
+          </a:prstGeom>
+          <a:noFill/>
+        </p:spPr>
+        <p:txBody>
+          <a:bodyPr wrap="square" rtlCol="0">
+            <a:spAutoFit/>
+          </a:bodyPr>
+          <a:p>
+            <a:pPr algn="l"/>
+            <a:r>
+              <a:rPr lang="en-US" b="1">
+                <a:solidFill>
+                  <a:schemeClr val="accent5">
+                    <a:lumMod val="75000"/>
+                  </a:schemeClr>
+                </a:solidFill>
+              </a:rPr>
+              <a:t>Force [KN]</a:t>
+            </a:r>
+            <a:endParaRPr lang="en-US" b="1" baseline="-25000">
+              <a:solidFill>
+                <a:schemeClr val="accent5">
+                  <a:lumMod val="75000"/>
+                </a:schemeClr>
+              </a:solidFill>
+            </a:endParaRPr>
+          </a:p>
+        </p:txBody>
+      </p:sp>
+      <p:cxnSp>
+        <p:nvCxnSpPr>
+          <p:cNvPr id="31" name="Straight Connector 30"/>
+          <p:cNvCxnSpPr/>
+          <p:nvPr/>
+        </p:nvCxnSpPr>
+        <p:spPr>
+          <a:xfrm flipV="1">
+            <a:off x="1599565" y="4504055"/>
+            <a:ext cx="1929130" cy="990600"/>
+          </a:xfrm>
+          <a:prstGeom prst="line">
+            <a:avLst/>
+          </a:prstGeom>
+          <a:ln w="28575" cmpd="sng">
+            <a:solidFill>
+              <a:schemeClr val="accent1">
+                <a:shade val="50000"/>
+              </a:schemeClr>
+            </a:solidFill>
+            <a:prstDash val="solid"/>
+          </a:ln>
+        </p:spPr>
+        <p:style>
+          <a:lnRef idx="1">
+            <a:schemeClr val="accent1"/>
+          </a:lnRef>
+          <a:fillRef idx="0">
+            <a:schemeClr val="accent1"/>
+          </a:fillRef>
+          <a:effectRef idx="0">
+            <a:schemeClr val="accent1"/>
+          </a:effectRef>
+          <a:fontRef idx="minor">
+            <a:schemeClr val="tx1"/>
+          </a:fontRef>
+        </p:style>
+      </p:cxnSp>
+      <p:cxnSp>
+        <p:nvCxnSpPr>
+          <p:cNvPr id="32" name="Straight Connector 31"/>
+          <p:cNvCxnSpPr/>
+          <p:nvPr/>
+        </p:nvCxnSpPr>
+        <p:spPr>
+          <a:xfrm>
+            <a:off x="3481070" y="4547235"/>
+            <a:ext cx="0" cy="904875"/>
+          </a:xfrm>
+          <a:prstGeom prst="line">
+            <a:avLst/>
+          </a:prstGeom>
+          <a:ln w="28575" cmpd="sng">
+            <a:solidFill>
+              <a:schemeClr val="accent1">
+                <a:shade val="50000"/>
+              </a:schemeClr>
+            </a:solidFill>
+            <a:prstDash val="solid"/>
+          </a:ln>
+        </p:spPr>
+        <p:style>
+          <a:lnRef idx="1">
+            <a:schemeClr val="accent1"/>
+          </a:lnRef>
+          <a:fillRef idx="0">
+            <a:schemeClr val="accent1"/>
+          </a:fillRef>
+          <a:effectRef idx="0">
+            <a:schemeClr val="accent1"/>
+          </a:effectRef>
+          <a:fontRef idx="minor">
+            <a:schemeClr val="tx1"/>
+          </a:fontRef>
+        </p:style>
+      </p:cxnSp>
+      <p:cxnSp>
+        <p:nvCxnSpPr>
+          <p:cNvPr id="33" name="Straight Connector 32"/>
+          <p:cNvCxnSpPr/>
+          <p:nvPr/>
+        </p:nvCxnSpPr>
+        <p:spPr>
+          <a:xfrm>
+            <a:off x="3493770" y="5491480"/>
+            <a:ext cx="1830070" cy="0"/>
+          </a:xfrm>
+          <a:prstGeom prst="line">
+            <a:avLst/>
+          </a:prstGeom>
+          <a:ln w="28575" cmpd="sng">
+            <a:solidFill>
+              <a:schemeClr val="accent1">
+                <a:shade val="50000"/>
+              </a:schemeClr>
+            </a:solidFill>
+            <a:prstDash val="solid"/>
+          </a:ln>
+        </p:spPr>
+        <p:style>
+          <a:lnRef idx="1">
+            <a:schemeClr val="accent1"/>
+          </a:lnRef>
+          <a:fillRef idx="0">
+            <a:schemeClr val="accent1"/>
+          </a:fillRef>
+          <a:effectRef idx="0">
+            <a:schemeClr val="accent1"/>
+          </a:effectRef>
+          <a:fontRef idx="minor">
+            <a:schemeClr val="tx1"/>
+          </a:fontRef>
+        </p:style>
+      </p:cxnSp>
+      <p:cxnSp>
+        <p:nvCxnSpPr>
+          <p:cNvPr id="34" name="Straight Connector 33"/>
+          <p:cNvCxnSpPr/>
+          <p:nvPr/>
+        </p:nvCxnSpPr>
+        <p:spPr>
+          <a:xfrm>
+            <a:off x="5331460" y="5499735"/>
+            <a:ext cx="0" cy="904875"/>
+          </a:xfrm>
+          <a:prstGeom prst="line">
+            <a:avLst/>
+          </a:prstGeom>
+          <a:ln w="28575" cmpd="sng">
+            <a:solidFill>
+              <a:schemeClr val="accent1">
+                <a:shade val="50000"/>
+              </a:schemeClr>
+            </a:solidFill>
+            <a:prstDash val="solid"/>
+          </a:ln>
+        </p:spPr>
+        <p:style>
+          <a:lnRef idx="1">
+            <a:schemeClr val="accent1"/>
+          </a:lnRef>
+          <a:fillRef idx="0">
+            <a:schemeClr val="accent1"/>
+          </a:fillRef>
+          <a:effectRef idx="0">
+            <a:schemeClr val="accent1"/>
+          </a:effectRef>
+          <a:fontRef idx="minor">
+            <a:schemeClr val="tx1"/>
+          </a:fontRef>
+        </p:style>
+      </p:cxnSp>
+      <p:cxnSp>
+        <p:nvCxnSpPr>
+          <p:cNvPr id="35" name="Straight Connector 34"/>
+          <p:cNvCxnSpPr/>
+          <p:nvPr/>
+        </p:nvCxnSpPr>
+        <p:spPr>
+          <a:xfrm flipV="1">
+            <a:off x="5323840" y="5491480"/>
+            <a:ext cx="1962150" cy="908050"/>
+          </a:xfrm>
+          <a:prstGeom prst="line">
+            <a:avLst/>
+          </a:prstGeom>
+          <a:ln w="28575" cmpd="sng">
+            <a:solidFill>
+              <a:schemeClr val="accent1">
+                <a:shade val="50000"/>
+              </a:schemeClr>
+            </a:solidFill>
+            <a:prstDash val="solid"/>
+          </a:ln>
+        </p:spPr>
+        <p:style>
+          <a:lnRef idx="1">
+            <a:schemeClr val="accent1"/>
+          </a:lnRef>
+          <a:fillRef idx="0">
+            <a:schemeClr val="accent1"/>
+          </a:fillRef>
+          <a:effectRef idx="0">
+            <a:schemeClr val="accent1"/>
+          </a:effectRef>
+          <a:fontRef idx="minor">
+            <a:schemeClr val="tx1"/>
+          </a:fontRef>
+        </p:style>
+      </p:cxnSp>
+      <p:cxnSp>
+        <p:nvCxnSpPr>
+          <p:cNvPr id="36" name="Straight Connector 35"/>
+          <p:cNvCxnSpPr/>
+          <p:nvPr/>
+        </p:nvCxnSpPr>
+        <p:spPr>
+          <a:xfrm>
+            <a:off x="7273925" y="5500370"/>
+            <a:ext cx="1830070" cy="0"/>
+          </a:xfrm>
+          <a:prstGeom prst="line">
+            <a:avLst/>
+          </a:prstGeom>
+          <a:ln w="28575" cmpd="sng">
+            <a:solidFill>
+              <a:schemeClr val="accent1">
+                <a:shade val="50000"/>
+              </a:schemeClr>
+            </a:solidFill>
+            <a:prstDash val="solid"/>
+          </a:ln>
+        </p:spPr>
+        <p:style>
+          <a:lnRef idx="1">
+            <a:schemeClr val="accent1"/>
+          </a:lnRef>
+          <a:fillRef idx="0">
+            <a:schemeClr val="accent1"/>
+          </a:fillRef>
+          <a:effectRef idx="0">
+            <a:schemeClr val="accent1"/>
+          </a:effectRef>
+          <a:fontRef idx="minor">
+            <a:schemeClr val="tx1"/>
+          </a:fontRef>
+        </p:style>
+      </p:cxnSp>
+      <p:sp>
+        <p:nvSpPr>
+          <p:cNvPr id="37" name="Text Box 36"/>
+          <p:cNvSpPr txBox="1"/>
+          <p:nvPr/>
+        </p:nvSpPr>
+        <p:spPr>
+          <a:xfrm>
+            <a:off x="9548495" y="5017135"/>
+            <a:ext cx="2018665" cy="368300"/>
+          </a:xfrm>
+          <a:prstGeom prst="rect">
+            <a:avLst/>
+          </a:prstGeom>
+          <a:noFill/>
+        </p:spPr>
+        <p:txBody>
+          <a:bodyPr wrap="square" rtlCol="0">
+            <a:spAutoFit/>
+          </a:bodyPr>
+          <a:p>
+            <a:pPr algn="l"/>
+            <a:r>
+              <a:rPr lang="en-US" b="1">
+                <a:solidFill>
+                  <a:schemeClr val="accent5">
+                    <a:lumMod val="75000"/>
+                  </a:schemeClr>
+                </a:solidFill>
+              </a:rPr>
+              <a:t>Power [kW]</a:t>
+            </a:r>
+            <a:endParaRPr lang="en-US" b="1" baseline="-25000">
+              <a:solidFill>
+                <a:schemeClr val="accent5">
+                  <a:lumMod val="75000"/>
+                </a:schemeClr>
+              </a:solidFill>
+            </a:endParaRPr>
+          </a:p>
+        </p:txBody>
+      </p:sp>
+      <p:sp>
+        <p:nvSpPr>
+          <p:cNvPr id="38" name="Text Box 37"/>
+          <p:cNvSpPr txBox="1"/>
+          <p:nvPr/>
+        </p:nvSpPr>
+        <p:spPr>
+          <a:xfrm>
+            <a:off x="7355840" y="4094480"/>
+            <a:ext cx="1162050" cy="368300"/>
+          </a:xfrm>
+          <a:prstGeom prst="rect">
+            <a:avLst/>
+          </a:prstGeom>
+          <a:noFill/>
+        </p:spPr>
+        <p:txBody>
+          <a:bodyPr wrap="square" rtlCol="0">
+            <a:spAutoFit/>
+          </a:bodyPr>
+          <a:p>
+            <a:pPr algn="l"/>
+            <a:r>
+              <a:rPr lang="en-US" b="1">
+                <a:solidFill>
+                  <a:schemeClr val="accent5">
+                    <a:lumMod val="75000"/>
+                  </a:schemeClr>
+                </a:solidFill>
+              </a:rPr>
+              <a:t>-2.5</a:t>
+            </a:r>
+            <a:endParaRPr lang="en-US" b="1" baseline="-25000">
+              <a:solidFill>
+                <a:schemeClr val="accent5">
+                  <a:lumMod val="75000"/>
+                </a:schemeClr>
+              </a:solidFill>
+            </a:endParaRPr>
+          </a:p>
+        </p:txBody>
+      </p:sp>
+      <p:sp>
+        <p:nvSpPr>
+          <p:cNvPr id="39" name="Text Box 38"/>
+          <p:cNvSpPr txBox="1"/>
+          <p:nvPr/>
+        </p:nvSpPr>
+        <p:spPr>
+          <a:xfrm>
+            <a:off x="5323840" y="6304280"/>
+            <a:ext cx="1162050" cy="368300"/>
+          </a:xfrm>
+          <a:prstGeom prst="rect">
+            <a:avLst/>
+          </a:prstGeom>
+          <a:noFill/>
+        </p:spPr>
+        <p:txBody>
+          <a:bodyPr wrap="square" rtlCol="0">
+            <a:spAutoFit/>
+          </a:bodyPr>
+          <a:p>
+            <a:pPr algn="l"/>
+            <a:r>
+              <a:rPr lang="en-US" b="1">
+                <a:solidFill>
+                  <a:schemeClr val="accent5">
+                    <a:lumMod val="75000"/>
+                  </a:schemeClr>
+                </a:solidFill>
+              </a:rPr>
+              <a:t>-62.5</a:t>
+            </a:r>
+            <a:endParaRPr lang="en-US" b="1" baseline="-25000">
+              <a:solidFill>
+                <a:schemeClr val="accent5">
+                  <a:lumMod val="75000"/>
+                </a:schemeClr>
+              </a:solidFill>
+            </a:endParaRPr>
+          </a:p>
+        </p:txBody>
+      </p:sp>
+      <p:sp>
+        <p:nvSpPr>
+          <p:cNvPr id="40" name="Text Box 39"/>
+          <p:cNvSpPr txBox="1"/>
+          <p:nvPr/>
+        </p:nvSpPr>
+        <p:spPr>
+          <a:xfrm>
+            <a:off x="510540" y="4255770"/>
+            <a:ext cx="1162050" cy="368300"/>
+          </a:xfrm>
+          <a:prstGeom prst="rect">
+            <a:avLst/>
+          </a:prstGeom>
+          <a:noFill/>
+        </p:spPr>
+        <p:txBody>
+          <a:bodyPr wrap="square" rtlCol="0">
+            <a:spAutoFit/>
+          </a:bodyPr>
+          <a:p>
+            <a:pPr algn="r"/>
+            <a:r>
+              <a:rPr lang="en-US" b="1">
+                <a:solidFill>
+                  <a:schemeClr val="accent5">
+                    <a:lumMod val="75000"/>
+                  </a:schemeClr>
+                </a:solidFill>
+              </a:rPr>
+              <a:t>62.5</a:t>
+            </a:r>
+            <a:endParaRPr lang="en-US" b="1" baseline="-25000">
+              <a:solidFill>
+                <a:schemeClr val="accent5">
+                  <a:lumMod val="75000"/>
+                </a:schemeClr>
+              </a:solidFill>
+            </a:endParaRPr>
+          </a:p>
+        </p:txBody>
+      </p:sp>
+      <p:sp>
+        <p:nvSpPr>
+          <p:cNvPr id="41" name="Text Box 40"/>
+          <p:cNvSpPr txBox="1"/>
+          <p:nvPr/>
+        </p:nvSpPr>
+        <p:spPr>
+          <a:xfrm>
+            <a:off x="3463290" y="4255770"/>
+            <a:ext cx="1162050" cy="368300"/>
+          </a:xfrm>
+          <a:prstGeom prst="rect">
+            <a:avLst/>
+          </a:prstGeom>
+          <a:noFill/>
+        </p:spPr>
+        <p:txBody>
+          <a:bodyPr wrap="square" rtlCol="0">
+            <a:spAutoFit/>
+          </a:bodyPr>
+          <a:p>
+            <a:pPr algn="l"/>
+            <a:r>
+              <a:rPr lang="en-US" b="1">
+                <a:solidFill>
+                  <a:schemeClr val="accent5">
+                    <a:lumMod val="75000"/>
+                  </a:schemeClr>
+                </a:solidFill>
+              </a:rPr>
+              <a:t>62.5</a:t>
+            </a:r>
+            <a:endParaRPr lang="en-US" b="1" baseline="-25000">
+              <a:solidFill>
+                <a:schemeClr val="accent5">
+                  <a:lumMod val="75000"/>
+                </a:schemeClr>
+              </a:solidFill>
+            </a:endParaRPr>
+          </a:p>
+        </p:txBody>
+      </p:sp>
+      <p:cxnSp>
+        <p:nvCxnSpPr>
+          <p:cNvPr id="42" name="Straight Connector 41"/>
+          <p:cNvCxnSpPr/>
+          <p:nvPr/>
+        </p:nvCxnSpPr>
+        <p:spPr>
+          <a:xfrm>
+            <a:off x="1571625" y="5977890"/>
+            <a:ext cx="1898650" cy="0"/>
+          </a:xfrm>
+          <a:prstGeom prst="line">
+            <a:avLst/>
+          </a:prstGeom>
+          <a:ln w="28575" cmpd="sng">
+            <a:solidFill>
+              <a:schemeClr val="tx1"/>
+            </a:solidFill>
+            <a:prstDash val="sysDash"/>
+            <a:headEnd type="arrow" w="med" len="med"/>
+            <a:tailEnd type="arrow" w="med" len="med"/>
+          </a:ln>
+        </p:spPr>
+        <p:style>
+          <a:lnRef idx="1">
+            <a:schemeClr val="accent1"/>
+          </a:lnRef>
+          <a:fillRef idx="0">
+            <a:schemeClr val="accent1"/>
+          </a:fillRef>
+          <a:effectRef idx="0">
+            <a:schemeClr val="accent1"/>
+          </a:effectRef>
+          <a:fontRef idx="minor">
+            <a:schemeClr val="tx1"/>
+          </a:fontRef>
+        </p:style>
+      </p:cxnSp>
+      <p:sp>
+        <p:nvSpPr>
+          <p:cNvPr id="43" name="Text Box 42"/>
+          <p:cNvSpPr txBox="1"/>
+          <p:nvPr/>
+        </p:nvSpPr>
+        <p:spPr>
+          <a:xfrm>
+            <a:off x="1955165" y="5967730"/>
+            <a:ext cx="1162050" cy="368300"/>
+          </a:xfrm>
+          <a:prstGeom prst="rect">
+            <a:avLst/>
+          </a:prstGeom>
+          <a:noFill/>
+        </p:spPr>
+        <p:txBody>
+          <a:bodyPr wrap="square" rtlCol="0">
+            <a:spAutoFit/>
+          </a:bodyPr>
+          <a:p>
+            <a:pPr algn="ctr"/>
+            <a:r>
+              <a:rPr lang="en-US" b="1">
+                <a:solidFill>
+                  <a:schemeClr val="tx1"/>
+                </a:solidFill>
+              </a:rPr>
+              <a:t>10s</a:t>
+            </a:r>
+            <a:endParaRPr lang="en-US" b="1" baseline="-25000">
+              <a:solidFill>
+                <a:schemeClr val="tx1"/>
+              </a:solidFill>
+            </a:endParaRPr>
+          </a:p>
+        </p:txBody>
+      </p:sp>
+    </p:spTree>
+  </p:cSld>
+  <p:clrMapOvr>
+    <a:masterClrMapping/>
+  </p:clrMapOvr>
+</p:sld>
+</file>
+
+<file path=ppt/slides/slide6.xml><?xml version="1.0" encoding="utf-8"?>
+<p:sld xmlns:a="http://schemas.openxmlformats.org/drawingml/2006/main" xmlns:r="http://schemas.openxmlformats.org/officeDocument/2006/relationships" xmlns:p="http://schemas.openxmlformats.org/presentationml/2006/main">
+  <p:cSld>
+    <p:spTree>
+      <p:nvGrpSpPr>
+        <p:cNvPr id="1" name=""/>
+        <p:cNvGrpSpPr/>
+        <p:nvPr/>
+      </p:nvGrpSpPr>
+      <p:grpSpPr/>
+      <p:pic>
+        <p:nvPicPr>
+          <p:cNvPr id="4" name="Picture 3" descr="torque_speed_curve"/>
+          <p:cNvPicPr>
+            <a:picLocks noChangeAspect="1"/>
+          </p:cNvPicPr>
+          <p:nvPr/>
+        </p:nvPicPr>
+        <p:blipFill>
+          <a:blip r:embed="rId1"/>
+          <a:stretch>
+            <a:fillRect/>
+          </a:stretch>
+        </p:blipFill>
+        <p:spPr>
+          <a:xfrm>
+            <a:off x="2418080" y="966470"/>
+            <a:ext cx="7395845" cy="5071745"/>
+          </a:xfrm>
+          <a:prstGeom prst="rect">
+            <a:avLst/>
+          </a:prstGeom>
+        </p:spPr>
+      </p:pic>
+      <p:sp>
+        <p:nvSpPr>
+          <p:cNvPr id="5" name="Text Box 4"/>
+          <p:cNvSpPr txBox="1"/>
+          <p:nvPr/>
+        </p:nvSpPr>
+        <p:spPr>
+          <a:xfrm>
+            <a:off x="1725295" y="598170"/>
+            <a:ext cx="1600200" cy="368300"/>
+          </a:xfrm>
+          <a:prstGeom prst="rect">
+            <a:avLst/>
+          </a:prstGeom>
+          <a:noFill/>
+        </p:spPr>
+        <p:txBody>
+          <a:bodyPr wrap="none" rtlCol="0">
+            <a:spAutoFit/>
+          </a:bodyPr>
+          <a:p>
+            <a:r>
+              <a:rPr lang="en-US" b="1"/>
+              <a:t>Torque/Power</a:t>
+            </a:r>
+            <a:endParaRPr lang="en-US" b="1"/>
+          </a:p>
+        </p:txBody>
+      </p:sp>
+      <p:sp>
+        <p:nvSpPr>
+          <p:cNvPr id="6" name="Text Box 5"/>
+          <p:cNvSpPr txBox="1"/>
+          <p:nvPr/>
+        </p:nvSpPr>
+        <p:spPr>
+          <a:xfrm>
+            <a:off x="9813925" y="4904105"/>
+            <a:ext cx="617220" cy="368300"/>
+          </a:xfrm>
+          <a:prstGeom prst="rect">
+            <a:avLst/>
+          </a:prstGeom>
+          <a:noFill/>
+        </p:spPr>
+        <p:txBody>
+          <a:bodyPr wrap="none" rtlCol="0">
+            <a:spAutoFit/>
+          </a:bodyPr>
+          <a:p>
+            <a:r>
+              <a:rPr lang="en-US" b="1"/>
+              <a:t>w(v)</a:t>
+            </a:r>
+            <a:endParaRPr lang="en-US" b="1"/>
+          </a:p>
+        </p:txBody>
+      </p:sp>
+      <p:sp>
+        <p:nvSpPr>
+          <p:cNvPr id="7" name="Text Box 6"/>
+          <p:cNvSpPr txBox="1"/>
+          <p:nvPr/>
+        </p:nvSpPr>
+        <p:spPr>
+          <a:xfrm>
+            <a:off x="5194935" y="1615440"/>
+            <a:ext cx="1329055" cy="368300"/>
+          </a:xfrm>
+          <a:prstGeom prst="rect">
+            <a:avLst/>
+          </a:prstGeom>
+          <a:noFill/>
+        </p:spPr>
+        <p:txBody>
+          <a:bodyPr wrap="none" rtlCol="0">
+            <a:spAutoFit/>
+          </a:bodyPr>
+          <a:p>
+            <a:r>
+              <a:rPr lang="en-US" b="1">
+                <a:solidFill>
+                  <a:schemeClr val="accent6">
+                    <a:lumMod val="75000"/>
+                  </a:schemeClr>
+                </a:solidFill>
+              </a:rPr>
+              <a:t>P</a:t>
+            </a:r>
+            <a:r>
+              <a:rPr lang="en-US" b="1" baseline="-25000">
+                <a:solidFill>
+                  <a:schemeClr val="accent6">
+                    <a:lumMod val="75000"/>
+                  </a:schemeClr>
+                </a:solidFill>
+              </a:rPr>
+              <a:t>T</a:t>
+            </a:r>
+            <a:r>
+              <a:rPr lang="en-US" b="1">
+                <a:solidFill>
+                  <a:srgbClr val="00B050"/>
+                </a:solidFill>
+              </a:rPr>
+              <a:t> </a:t>
+            </a:r>
+            <a:r>
+              <a:rPr lang="en-US" b="1">
+                <a:solidFill>
+                  <a:srgbClr val="FF0000"/>
+                </a:solidFill>
+              </a:rPr>
+              <a:t>= F</a:t>
+            </a:r>
+            <a:r>
+              <a:rPr lang="en-US" b="1" baseline="-25000">
+                <a:solidFill>
+                  <a:srgbClr val="FF0000"/>
+                </a:solidFill>
+              </a:rPr>
+              <a:t>T</a:t>
+            </a:r>
+            <a:r>
+              <a:rPr lang="en-US" b="1">
+                <a:solidFill>
+                  <a:schemeClr val="tx1"/>
+                </a:solidFill>
+              </a:rPr>
+              <a:t>*v</a:t>
+            </a:r>
+            <a:endParaRPr lang="en-US" b="1">
+              <a:solidFill>
+                <a:schemeClr val="tx1"/>
+              </a:solidFill>
+            </a:endParaRPr>
+          </a:p>
+        </p:txBody>
+      </p:sp>
+      <p:sp>
+        <p:nvSpPr>
+          <p:cNvPr id="8" name="Text Box 7"/>
+          <p:cNvSpPr txBox="1"/>
+          <p:nvPr/>
+        </p:nvSpPr>
+        <p:spPr>
+          <a:xfrm>
+            <a:off x="4371340" y="5272405"/>
+            <a:ext cx="1570355" cy="368300"/>
+          </a:xfrm>
+          <a:prstGeom prst="rect">
+            <a:avLst/>
+          </a:prstGeom>
+          <a:noFill/>
+        </p:spPr>
+        <p:txBody>
+          <a:bodyPr wrap="none" rtlCol="0">
+            <a:spAutoFit/>
+          </a:bodyPr>
+          <a:p>
+            <a:r>
+              <a:rPr lang="en-US" b="1"/>
+              <a:t>v</a:t>
+            </a:r>
+            <a:r>
+              <a:rPr lang="en-US" b="1" baseline="-25000"/>
+              <a:t>B</a:t>
+            </a:r>
+            <a:r>
+              <a:rPr lang="en-US" b="1"/>
+              <a:t> = 10m/s</a:t>
+            </a:r>
+            <a:endParaRPr lang="en-US" b="1"/>
+          </a:p>
+        </p:txBody>
+      </p:sp>
+      <p:sp>
+        <p:nvSpPr>
+          <p:cNvPr id="10" name="Text Box 9"/>
+          <p:cNvSpPr txBox="1"/>
+          <p:nvPr/>
+        </p:nvSpPr>
+        <p:spPr>
+          <a:xfrm>
+            <a:off x="1448435" y="1247140"/>
+            <a:ext cx="1009015" cy="368300"/>
+          </a:xfrm>
+          <a:prstGeom prst="rect">
+            <a:avLst/>
+          </a:prstGeom>
+          <a:noFill/>
+        </p:spPr>
+        <p:txBody>
+          <a:bodyPr wrap="none" rtlCol="0">
+            <a:spAutoFit/>
+          </a:bodyPr>
+          <a:p>
+            <a:r>
+              <a:rPr lang="en-US" b="1">
+                <a:solidFill>
+                  <a:srgbClr val="FF0000"/>
+                </a:solidFill>
+              </a:rPr>
+              <a:t>3625N</a:t>
+            </a:r>
+            <a:endParaRPr lang="en-US" b="1" baseline="-25000">
+              <a:solidFill>
+                <a:srgbClr val="FF0000"/>
+              </a:solidFill>
+            </a:endParaRPr>
+          </a:p>
+        </p:txBody>
+      </p:sp>
+      <p:sp>
+        <p:nvSpPr>
+          <p:cNvPr id="11" name="Text Box 10"/>
+          <p:cNvSpPr txBox="1"/>
+          <p:nvPr/>
+        </p:nvSpPr>
+        <p:spPr>
+          <a:xfrm>
+            <a:off x="1720850" y="2132965"/>
+            <a:ext cx="697230" cy="368300"/>
+          </a:xfrm>
+          <a:prstGeom prst="rect">
+            <a:avLst/>
+          </a:prstGeom>
+          <a:noFill/>
+        </p:spPr>
+        <p:txBody>
+          <a:bodyPr wrap="none" rtlCol="0">
+            <a:spAutoFit/>
+          </a:bodyPr>
+          <a:p>
+            <a:r>
+              <a:rPr lang="en-US" b="1">
+                <a:solidFill>
+                  <a:schemeClr val="accent6">
+                    <a:lumMod val="75000"/>
+                  </a:schemeClr>
+                </a:solidFill>
+              </a:rPr>
+              <a:t>P</a:t>
+            </a:r>
+            <a:r>
+              <a:rPr lang="en-US" b="1" baseline="-25000">
+                <a:solidFill>
+                  <a:schemeClr val="accent6">
+                    <a:lumMod val="75000"/>
+                  </a:schemeClr>
+                </a:solidFill>
+              </a:rPr>
+              <a:t>Tmax</a:t>
+            </a:r>
+            <a:endParaRPr lang="en-US" b="1" baseline="-25000">
+              <a:solidFill>
+                <a:schemeClr val="accent6">
+                  <a:lumMod val="75000"/>
+                </a:schemeClr>
+              </a:solidFill>
+            </a:endParaRPr>
+          </a:p>
+        </p:txBody>
+      </p:sp>
+      <p:cxnSp>
+        <p:nvCxnSpPr>
+          <p:cNvPr id="12" name="Straight Connector 11"/>
+          <p:cNvCxnSpPr/>
+          <p:nvPr/>
+        </p:nvCxnSpPr>
+        <p:spPr>
+          <a:xfrm flipH="1">
+            <a:off x="2535555" y="2317115"/>
+            <a:ext cx="2452370" cy="0"/>
+          </a:xfrm>
+          <a:prstGeom prst="line">
+            <a:avLst/>
+          </a:prstGeom>
+          <a:ln w="28575" cmpd="sng">
+            <a:solidFill>
+              <a:schemeClr val="accent1">
+                <a:shade val="50000"/>
+              </a:schemeClr>
+            </a:solidFill>
+            <a:prstDash val="sysDot"/>
+          </a:ln>
+        </p:spPr>
+        <p:style>
+          <a:lnRef idx="1">
+            <a:schemeClr val="accent1"/>
+          </a:lnRef>
+          <a:fillRef idx="0">
+            <a:schemeClr val="accent1"/>
+          </a:fillRef>
+          <a:effectRef idx="0">
+            <a:schemeClr val="accent1"/>
+          </a:effectRef>
+          <a:fontRef idx="minor">
+            <a:schemeClr val="tx1"/>
+          </a:fontRef>
+        </p:style>
+      </p:cxnSp>
+    </p:spTree>
+  </p:cSld>
+  <p:clrMapOvr>
+    <a:masterClrMapping/>
+  </p:clrMapOvr>
+</p:sld>
+</file>
+
+<file path=ppt/slides/slide7.xml><?xml version="1.0" encoding="utf-8"?>
+<p:sld xmlns:a="http://schemas.openxmlformats.org/drawingml/2006/main" xmlns:r="http://schemas.openxmlformats.org/officeDocument/2006/relationships" xmlns:p="http://schemas.openxmlformats.org/presentationml/2006/main">
+  <p:cSld>
+    <p:spTree>
+      <p:nvGrpSpPr>
+        <p:cNvPr id="1" name=""/>
+        <p:cNvGrpSpPr/>
+        <p:nvPr/>
+      </p:nvGrpSpPr>
+      <p:grpSpPr/>
+      <p:pic>
+        <p:nvPicPr>
+          <p:cNvPr id="6" name="Picture 5" descr="Screenshot from 2024-05-29 16-04-25"/>
+          <p:cNvPicPr>
+            <a:picLocks noChangeAspect="1"/>
+          </p:cNvPicPr>
+          <p:nvPr/>
+        </p:nvPicPr>
+        <p:blipFill>
+          <a:blip r:embed="rId1"/>
+          <a:stretch>
+            <a:fillRect/>
+          </a:stretch>
+        </p:blipFill>
+        <p:spPr>
+          <a:xfrm>
+            <a:off x="374015" y="541020"/>
+            <a:ext cx="10141585" cy="6084570"/>
+          </a:xfrm>
+          <a:prstGeom prst="rect">
+            <a:avLst/>
+          </a:prstGeom>
+        </p:spPr>
+      </p:pic>
+      <p:cxnSp>
+        <p:nvCxnSpPr>
+          <p:cNvPr id="9" name="Straight Connector 8"/>
+          <p:cNvCxnSpPr/>
+          <p:nvPr/>
+        </p:nvCxnSpPr>
+        <p:spPr>
+          <a:xfrm flipH="1">
+            <a:off x="1741170" y="541020"/>
+            <a:ext cx="19050" cy="5769610"/>
+          </a:xfrm>
+          <a:prstGeom prst="line">
+            <a:avLst/>
+          </a:prstGeom>
+          <a:ln w="28575" cmpd="sng">
+            <a:solidFill>
+              <a:schemeClr val="accent1">
+                <a:shade val="50000"/>
+              </a:schemeClr>
+            </a:solidFill>
+            <a:prstDash val="sysDot"/>
+          </a:ln>
+        </p:spPr>
+        <p:style>
+          <a:lnRef idx="3">
+            <a:schemeClr val="accent1"/>
+          </a:lnRef>
+          <a:fillRef idx="0">
+            <a:schemeClr val="accent1"/>
+          </a:fillRef>
+          <a:effectRef idx="2">
+            <a:schemeClr val="accent1"/>
+          </a:effectRef>
+          <a:fontRef idx="minor">
+            <a:schemeClr val="tx1"/>
+          </a:fontRef>
+        </p:style>
+      </p:cxnSp>
+      <p:sp>
+        <p:nvSpPr>
+          <p:cNvPr id="36" name="Text Box 35"/>
+          <p:cNvSpPr txBox="1"/>
+          <p:nvPr/>
+        </p:nvSpPr>
+        <p:spPr>
+          <a:xfrm>
+            <a:off x="1412875" y="172720"/>
+            <a:ext cx="675640" cy="368300"/>
+          </a:xfrm>
+          <a:prstGeom prst="rect">
+            <a:avLst/>
+          </a:prstGeom>
+          <a:noFill/>
+        </p:spPr>
+        <p:txBody>
+          <a:bodyPr wrap="square" rtlCol="0">
+            <a:spAutoFit/>
+          </a:bodyPr>
+          <a:p>
+            <a:pPr algn="ctr"/>
+            <a:r>
+              <a:rPr lang="en-US" b="1">
+                <a:solidFill>
+                  <a:schemeClr val="accent5"/>
+                </a:solidFill>
+              </a:rPr>
+              <a:t>V</a:t>
+            </a:r>
+            <a:r>
+              <a:rPr lang="en-US" b="1" baseline="-25000">
+                <a:solidFill>
+                  <a:schemeClr val="accent5"/>
+                </a:solidFill>
+              </a:rPr>
+              <a:t>B</a:t>
+            </a:r>
+            <a:endParaRPr lang="en-US" b="1" baseline="-25000">
+              <a:solidFill>
+                <a:schemeClr val="accent5"/>
+              </a:solidFill>
+            </a:endParaRPr>
+          </a:p>
+        </p:txBody>
+      </p:sp>
+      <p:sp>
+        <p:nvSpPr>
+          <p:cNvPr id="7" name="Text Box 6"/>
+          <p:cNvSpPr txBox="1"/>
+          <p:nvPr/>
+        </p:nvSpPr>
+        <p:spPr>
+          <a:xfrm>
+            <a:off x="10035540" y="3757930"/>
+            <a:ext cx="1881505" cy="368300"/>
+          </a:xfrm>
+          <a:prstGeom prst="rect">
+            <a:avLst/>
+          </a:prstGeom>
+          <a:noFill/>
+        </p:spPr>
+        <p:txBody>
+          <a:bodyPr wrap="square" rtlCol="0">
+            <a:spAutoFit/>
+          </a:bodyPr>
+          <a:p>
+            <a:pPr algn="ctr"/>
+            <a:r>
+              <a:rPr lang="en-US" b="1">
+                <a:solidFill>
+                  <a:schemeClr val="accent5"/>
+                </a:solidFill>
+              </a:rPr>
+              <a:t>212.7[km/h]</a:t>
+            </a:r>
+            <a:endParaRPr lang="en-US" b="1">
+              <a:solidFill>
+                <a:schemeClr val="accent5"/>
+              </a:solidFill>
+            </a:endParaRPr>
+          </a:p>
+        </p:txBody>
+      </p:sp>
+    </p:spTree>
+  </p:cSld>
+  <p:clrMapOvr>
+    <a:masterClrMapping/>
+  </p:clrMapOvr>
+</p:sld>
+</file>
+
+<file path=ppt/slides/slide8.xml><?xml version="1.0" encoding="utf-8"?>
+<p:sld xmlns:a="http://schemas.openxmlformats.org/drawingml/2006/main" xmlns:r="http://schemas.openxmlformats.org/officeDocument/2006/relationships" xmlns:p="http://schemas.openxmlformats.org/presentationml/2006/main">
+  <p:cSld>
+    <p:spTree>
+      <p:nvGrpSpPr>
+        <p:cNvPr id="1" name=""/>
+        <p:cNvGrpSpPr/>
+        <p:nvPr/>
+      </p:nvGrpSpPr>
+      <p:grpSpPr/>
+      <p:pic>
+        <p:nvPicPr>
+          <p:cNvPr id="4" name="Picture 3" descr="Screenshot from 2024-05-29 16-19-46"/>
+          <p:cNvPicPr>
+            <a:picLocks noChangeAspect="1"/>
+          </p:cNvPicPr>
+          <p:nvPr/>
+        </p:nvPicPr>
+        <p:blipFill>
+          <a:blip r:embed="rId1"/>
+          <a:stretch>
+            <a:fillRect/>
+          </a:stretch>
+        </p:blipFill>
+        <p:spPr>
+          <a:xfrm>
+            <a:off x="704850" y="241300"/>
+            <a:ext cx="10178415" cy="6190615"/>
+          </a:xfrm>
+          <a:prstGeom prst="rect">
+            <a:avLst/>
+          </a:prstGeom>
+        </p:spPr>
+      </p:pic>
+      <p:cxnSp>
+        <p:nvCxnSpPr>
+          <p:cNvPr id="9" name="Straight Connector 8"/>
+          <p:cNvCxnSpPr/>
+          <p:nvPr/>
+        </p:nvCxnSpPr>
+        <p:spPr>
+          <a:xfrm flipH="1">
+            <a:off x="2426970" y="363220"/>
+            <a:ext cx="19050" cy="5769610"/>
+          </a:xfrm>
+          <a:prstGeom prst="line">
+            <a:avLst/>
+          </a:prstGeom>
+          <a:ln w="28575" cmpd="sng">
+            <a:solidFill>
+              <a:schemeClr val="accent1">
+                <a:shade val="50000"/>
+              </a:schemeClr>
+            </a:solidFill>
+            <a:prstDash val="sysDot"/>
+          </a:ln>
+        </p:spPr>
+        <p:style>
+          <a:lnRef idx="3">
+            <a:schemeClr val="accent1"/>
+          </a:lnRef>
+          <a:fillRef idx="0">
+            <a:schemeClr val="accent1"/>
+          </a:fillRef>
+          <a:effectRef idx="2">
+            <a:schemeClr val="accent1"/>
+          </a:effectRef>
+          <a:fontRef idx="minor">
+            <a:schemeClr val="tx1"/>
+          </a:fontRef>
+        </p:style>
+      </p:cxnSp>
+      <p:sp>
+        <p:nvSpPr>
+          <p:cNvPr id="36" name="Text Box 35"/>
+          <p:cNvSpPr txBox="1"/>
+          <p:nvPr/>
+        </p:nvSpPr>
+        <p:spPr>
+          <a:xfrm>
+            <a:off x="2098675" y="0"/>
+            <a:ext cx="675640" cy="368300"/>
+          </a:xfrm>
+          <a:prstGeom prst="rect">
+            <a:avLst/>
+          </a:prstGeom>
+          <a:noFill/>
+        </p:spPr>
+        <p:txBody>
+          <a:bodyPr wrap="square" rtlCol="0">
+            <a:spAutoFit/>
+          </a:bodyPr>
+          <a:p>
+            <a:pPr algn="ctr"/>
+            <a:r>
+              <a:rPr lang="en-US" b="1">
+                <a:solidFill>
+                  <a:schemeClr val="accent5"/>
+                </a:solidFill>
+              </a:rPr>
+              <a:t>V</a:t>
+            </a:r>
+            <a:r>
+              <a:rPr lang="en-US" b="1" baseline="-25000">
+                <a:solidFill>
+                  <a:schemeClr val="accent5"/>
+                </a:solidFill>
+              </a:rPr>
+              <a:t>B</a:t>
+            </a:r>
+            <a:endParaRPr lang="en-US" b="1" baseline="-25000">
+              <a:solidFill>
+                <a:schemeClr val="accent5"/>
+              </a:solidFill>
+            </a:endParaRPr>
+          </a:p>
+        </p:txBody>
+      </p:sp>
+      <p:sp>
+        <p:nvSpPr>
+          <p:cNvPr id="5" name="Text Box 4"/>
+          <p:cNvSpPr txBox="1"/>
+          <p:nvPr/>
+        </p:nvSpPr>
+        <p:spPr>
+          <a:xfrm>
+            <a:off x="1463675" y="6273800"/>
+            <a:ext cx="1209040" cy="368300"/>
+          </a:xfrm>
+          <a:prstGeom prst="rect">
+            <a:avLst/>
+          </a:prstGeom>
+          <a:noFill/>
+        </p:spPr>
+        <p:txBody>
+          <a:bodyPr wrap="square" rtlCol="0">
+            <a:spAutoFit/>
+          </a:bodyPr>
+          <a:p>
+            <a:pPr algn="ctr"/>
+            <a:r>
+              <a:rPr lang="en-US" b="1">
+                <a:solidFill>
+                  <a:schemeClr val="accent5"/>
+                </a:solidFill>
+              </a:rPr>
+              <a:t>Linear</a:t>
+            </a:r>
+            <a:endParaRPr lang="en-US" b="1" baseline="-25000">
+              <a:solidFill>
+                <a:schemeClr val="accent5"/>
+              </a:solidFill>
+            </a:endParaRPr>
+          </a:p>
+        </p:txBody>
+      </p:sp>
+      <p:cxnSp>
+        <p:nvCxnSpPr>
+          <p:cNvPr id="6" name="Straight Arrow Connector 5"/>
+          <p:cNvCxnSpPr>
+            <a:stCxn id="5" idx="0"/>
+          </p:cNvCxnSpPr>
+          <p:nvPr/>
+        </p:nvCxnSpPr>
+        <p:spPr>
+          <a:xfrm flipV="1">
+            <a:off x="2068195" y="5651500"/>
+            <a:ext cx="0" cy="622300"/>
+          </a:xfrm>
+          <a:prstGeom prst="straightConnector1">
+            <a:avLst/>
+          </a:prstGeom>
+          <a:ln>
+            <a:tailEnd type="arrow" w="med" len="med"/>
+          </a:ln>
+        </p:spPr>
+        <p:style>
+          <a:lnRef idx="3">
+            <a:schemeClr val="accent5"/>
+          </a:lnRef>
+          <a:fillRef idx="0">
+            <a:schemeClr val="accent5"/>
+          </a:fillRef>
+          <a:effectRef idx="2">
+            <a:schemeClr val="accent5"/>
+          </a:effectRef>
+          <a:fontRef idx="minor">
+            <a:schemeClr val="tx1"/>
+          </a:fontRef>
+        </p:style>
+      </p:cxnSp>
+      <p:sp>
+        <p:nvSpPr>
+          <p:cNvPr id="7" name="Text Box 6"/>
+          <p:cNvSpPr txBox="1"/>
+          <p:nvPr/>
+        </p:nvSpPr>
+        <p:spPr>
+          <a:xfrm>
+            <a:off x="4892675" y="4978400"/>
+            <a:ext cx="2275840" cy="368300"/>
+          </a:xfrm>
+          <a:prstGeom prst="rect">
+            <a:avLst/>
+          </a:prstGeom>
+          <a:noFill/>
+        </p:spPr>
+        <p:txBody>
+          <a:bodyPr wrap="square" rtlCol="0">
+            <a:spAutoFit/>
+          </a:bodyPr>
+          <a:p>
+            <a:pPr algn="ctr"/>
+            <a:r>
+              <a:rPr lang="en-US" b="1">
+                <a:solidFill>
+                  <a:schemeClr val="accent5"/>
+                </a:solidFill>
+              </a:rPr>
+              <a:t>Non- Linear</a:t>
+            </a:r>
+            <a:endParaRPr lang="en-US" b="1" baseline="-25000">
+              <a:solidFill>
+                <a:schemeClr val="accent5"/>
+              </a:solidFill>
+            </a:endParaRPr>
+          </a:p>
+        </p:txBody>
+      </p:sp>
+      <p:cxnSp>
+        <p:nvCxnSpPr>
+          <p:cNvPr id="8" name="Straight Arrow Connector 7"/>
+          <p:cNvCxnSpPr/>
+          <p:nvPr/>
+        </p:nvCxnSpPr>
+        <p:spPr>
+          <a:xfrm flipH="1" flipV="1">
+            <a:off x="6007100" y="4546600"/>
+            <a:ext cx="23495" cy="431800"/>
+          </a:xfrm>
+          <a:prstGeom prst="straightConnector1">
+            <a:avLst/>
+          </a:prstGeom>
+          <a:ln>
+            <a:tailEnd type="arrow" w="med" len="med"/>
+          </a:ln>
+        </p:spPr>
+        <p:style>
+          <a:lnRef idx="3">
+            <a:schemeClr val="accent5"/>
+          </a:lnRef>
+          <a:fillRef idx="0">
+            <a:schemeClr val="accent5"/>
+          </a:fillRef>
+          <a:effectRef idx="2">
+            <a:schemeClr val="accent5"/>
+          </a:effectRef>
+          <a:fontRef idx="minor">
+            <a:schemeClr val="tx1"/>
+          </a:fontRef>
+        </p:style>
+      </p:cxnSp>
+    </p:spTree>
+  </p:cSld>
+  <p:clrMapOvr>
+    <a:masterClrMapping/>
+  </p:clrMapOvr>
+</p:sld>
+</file>
+
+<file path=ppt/slides/slide9.xml><?xml version="1.0" encoding="utf-8"?>
+<p:sld xmlns:a="http://schemas.openxmlformats.org/drawingml/2006/main" xmlns:r="http://schemas.openxmlformats.org/officeDocument/2006/relationships" xmlns:p="http://schemas.openxmlformats.org/presentationml/2006/main">
+  <p:cSld>
+    <p:spTree>
+      <p:nvGrpSpPr>
+        <p:cNvPr id="1" name=""/>
+        <p:cNvGrpSpPr/>
+        <p:nvPr/>
+      </p:nvGrpSpPr>
+      <p:grpSpPr/>
+      <p:pic>
+        <p:nvPicPr>
+          <p:cNvPr id="4" name="Picture 3" descr="Screenshot from 2024-05-29 16-29-36"/>
+          <p:cNvPicPr>
+            <a:picLocks noChangeAspect="1"/>
+          </p:cNvPicPr>
+          <p:nvPr/>
+        </p:nvPicPr>
+        <p:blipFill>
+          <a:blip r:embed="rId1"/>
+          <a:stretch>
+            <a:fillRect/>
+          </a:stretch>
+        </p:blipFill>
+        <p:spPr>
+          <a:xfrm>
+            <a:off x="92710" y="665480"/>
+            <a:ext cx="11517630" cy="5772150"/>
+          </a:xfrm>
+          <a:prstGeom prst="rect">
+            <a:avLst/>
+          </a:prstGeom>
+        </p:spPr>
+      </p:pic>
+    </p:spTree>
+  </p:cSld>
+  <p:clrMapOvr>
+    <a:masterClrMapping/>
+  </p:clrMapOvr>
+</p:sld>
+</file>
+
 <file path=ppt/theme/theme1.xml><?xml version="1.0" encoding="utf-8"?>
 <a:theme xmlns:a="http://schemas.openxmlformats.org/drawingml/2006/main" name="Office 主题">
   <a:themeElements>

</xml_diff>

<commit_message>
Added DC Machines - Circuit Model.
</commit_message>
<xml_diff>
--- a/ePWT/images/temp.pptx
+++ b/ePWT/images/temp.pptx
@@ -14,6 +14,8 @@
     <p:sldId id="262" r:id="rId9"/>
     <p:sldId id="263" r:id="rId10"/>
     <p:sldId id="264" r:id="rId11"/>
+    <p:sldId id="265" r:id="rId12"/>
+    <p:sldId id="266" r:id="rId13"/>
   </p:sldIdLst>
   <p:sldSz cx="12192000" cy="6858000"/>
   <p:notesSz cx="6858000" cy="9144000"/>
@@ -3215,6 +3217,638 @@
 </p:sld>
 </file>
 
+<file path=ppt/slides/slide10.xml><?xml version="1.0" encoding="utf-8"?>
+<p:sld xmlns:a="http://schemas.openxmlformats.org/drawingml/2006/main" xmlns:r="http://schemas.openxmlformats.org/officeDocument/2006/relationships" xmlns:p="http://schemas.openxmlformats.org/presentationml/2006/main">
+  <p:cSld>
+    <p:spTree>
+      <p:nvGrpSpPr>
+        <p:cNvPr id="1" name=""/>
+        <p:cNvGrpSpPr/>
+        <p:nvPr/>
+      </p:nvGrpSpPr>
+      <p:grpSpPr/>
+      <p:pic>
+        <p:nvPicPr>
+          <p:cNvPr id="4" name="Picture 3"/>
+          <p:cNvPicPr>
+            <a:picLocks noChangeAspect="1"/>
+          </p:cNvPicPr>
+          <p:nvPr/>
+        </p:nvPicPr>
+        <p:blipFill>
+          <a:blip r:embed="rId1"/>
+          <a:stretch>
+            <a:fillRect/>
+          </a:stretch>
+        </p:blipFill>
+        <p:spPr>
+          <a:xfrm>
+            <a:off x="2257425" y="1566545"/>
+            <a:ext cx="7677150" cy="3724275"/>
+          </a:xfrm>
+          <a:prstGeom prst="rect">
+            <a:avLst/>
+          </a:prstGeom>
+        </p:spPr>
+      </p:pic>
+      <p:sp>
+        <p:nvSpPr>
+          <p:cNvPr id="7" name="Text Box 6"/>
+          <p:cNvSpPr txBox="1"/>
+          <p:nvPr/>
+        </p:nvSpPr>
+        <p:spPr>
+          <a:xfrm>
+            <a:off x="3049905" y="4892040"/>
+            <a:ext cx="2703830" cy="398780"/>
+          </a:xfrm>
+          <a:prstGeom prst="rect">
+            <a:avLst/>
+          </a:prstGeom>
+          <a:noFill/>
+        </p:spPr>
+        <p:txBody>
+          <a:bodyPr wrap="square" rtlCol="0">
+            <a:spAutoFit/>
+          </a:bodyPr>
+          <a:p>
+            <a:pPr algn="ctr"/>
+            <a:r>
+              <a:rPr lang="en-US" sz="2000" b="1">
+                <a:solidFill>
+                  <a:schemeClr val="tx1"/>
+                </a:solidFill>
+              </a:rPr>
+              <a:t>Armature Circuit</a:t>
+            </a:r>
+            <a:endParaRPr lang="en-US" sz="2000" b="1">
+              <a:solidFill>
+                <a:schemeClr val="tx1"/>
+              </a:solidFill>
+            </a:endParaRPr>
+          </a:p>
+        </p:txBody>
+      </p:sp>
+      <p:sp>
+        <p:nvSpPr>
+          <p:cNvPr id="5" name="Text Box 4"/>
+          <p:cNvSpPr txBox="1"/>
+          <p:nvPr/>
+        </p:nvSpPr>
+        <p:spPr>
+          <a:xfrm>
+            <a:off x="8880475" y="4265930"/>
+            <a:ext cx="1881505" cy="398780"/>
+          </a:xfrm>
+          <a:prstGeom prst="rect">
+            <a:avLst/>
+          </a:prstGeom>
+          <a:noFill/>
+        </p:spPr>
+        <p:txBody>
+          <a:bodyPr wrap="square" rtlCol="0">
+            <a:spAutoFit/>
+          </a:bodyPr>
+          <a:p>
+            <a:pPr algn="ctr"/>
+            <a:r>
+              <a:rPr lang="en-US" sz="2000" b="1">
+                <a:solidFill>
+                  <a:schemeClr val="tx1"/>
+                </a:solidFill>
+              </a:rPr>
+              <a:t>Fixed Field</a:t>
+            </a:r>
+            <a:endParaRPr lang="en-US" sz="2000" b="1">
+              <a:solidFill>
+                <a:schemeClr val="tx1"/>
+              </a:solidFill>
+            </a:endParaRPr>
+          </a:p>
+        </p:txBody>
+      </p:sp>
+    </p:spTree>
+  </p:cSld>
+  <p:clrMapOvr>
+    <a:masterClrMapping/>
+  </p:clrMapOvr>
+</p:sld>
+</file>
+
+<file path=ppt/slides/slide11.xml><?xml version="1.0" encoding="utf-8"?>
+<p:sld xmlns:a="http://schemas.openxmlformats.org/drawingml/2006/main" xmlns:r="http://schemas.openxmlformats.org/officeDocument/2006/relationships" xmlns:p="http://schemas.openxmlformats.org/presentationml/2006/main">
+  <p:cSld>
+    <p:spTree>
+      <p:nvGrpSpPr>
+        <p:cNvPr id="1" name=""/>
+        <p:cNvGrpSpPr/>
+        <p:nvPr/>
+      </p:nvGrpSpPr>
+      <p:grpSpPr/>
+      <p:pic>
+        <p:nvPicPr>
+          <p:cNvPr id="5" name="Picture 4"/>
+          <p:cNvPicPr>
+            <a:picLocks noChangeAspect="1"/>
+          </p:cNvPicPr>
+          <p:nvPr/>
+        </p:nvPicPr>
+        <p:blipFill>
+          <a:blip r:embed="rId1"/>
+          <a:stretch>
+            <a:fillRect/>
+          </a:stretch>
+        </p:blipFill>
+        <p:spPr>
+          <a:xfrm>
+            <a:off x="767080" y="1189355"/>
+            <a:ext cx="6934200" cy="5257800"/>
+          </a:xfrm>
+          <a:prstGeom prst="rect">
+            <a:avLst/>
+          </a:prstGeom>
+        </p:spPr>
+      </p:pic>
+      <p:sp>
+        <p:nvSpPr>
+          <p:cNvPr id="7" name="Text Box 6"/>
+          <p:cNvSpPr txBox="1"/>
+          <p:nvPr/>
+        </p:nvSpPr>
+        <p:spPr>
+          <a:xfrm>
+            <a:off x="6785610" y="3404870"/>
+            <a:ext cx="3611245" cy="368300"/>
+          </a:xfrm>
+          <a:prstGeom prst="rect">
+            <a:avLst/>
+          </a:prstGeom>
+          <a:noFill/>
+        </p:spPr>
+        <p:txBody>
+          <a:bodyPr wrap="square" rtlCol="0">
+            <a:spAutoFit/>
+          </a:bodyPr>
+          <a:p>
+            <a:pPr algn="ctr"/>
+            <a:r>
+              <a:rPr lang="en-US" b="1">
+                <a:solidFill>
+                  <a:schemeClr val="accent5"/>
+                </a:solidFill>
+              </a:rPr>
+              <a:t>Magnetic Field Intensity</a:t>
+            </a:r>
+            <a:endParaRPr lang="en-US" b="1">
+              <a:solidFill>
+                <a:schemeClr val="accent5"/>
+              </a:solidFill>
+            </a:endParaRPr>
+          </a:p>
+        </p:txBody>
+      </p:sp>
+      <p:sp>
+        <p:nvSpPr>
+          <p:cNvPr id="6" name="Text Box 5"/>
+          <p:cNvSpPr txBox="1"/>
+          <p:nvPr/>
+        </p:nvSpPr>
+        <p:spPr>
+          <a:xfrm>
+            <a:off x="2630170" y="821055"/>
+            <a:ext cx="3207385" cy="368300"/>
+          </a:xfrm>
+          <a:prstGeom prst="rect">
+            <a:avLst/>
+          </a:prstGeom>
+          <a:noFill/>
+        </p:spPr>
+        <p:txBody>
+          <a:bodyPr wrap="square" rtlCol="0">
+            <a:spAutoFit/>
+          </a:bodyPr>
+          <a:p>
+            <a:pPr algn="ctr"/>
+            <a:r>
+              <a:rPr lang="en-US" b="1">
+                <a:solidFill>
+                  <a:schemeClr val="accent5"/>
+                </a:solidFill>
+              </a:rPr>
+              <a:t>Magnetic Flux Density</a:t>
+            </a:r>
+            <a:endParaRPr lang="en-US" b="1">
+              <a:solidFill>
+                <a:schemeClr val="accent5"/>
+              </a:solidFill>
+            </a:endParaRPr>
+          </a:p>
+        </p:txBody>
+      </p:sp>
+      <p:sp>
+        <p:nvSpPr>
+          <p:cNvPr id="8" name="Text Box 7"/>
+          <p:cNvSpPr txBox="1"/>
+          <p:nvPr/>
+        </p:nvSpPr>
+        <p:spPr>
+          <a:xfrm>
+            <a:off x="4246880" y="1147445"/>
+            <a:ext cx="3207385" cy="337185"/>
+          </a:xfrm>
+          <a:prstGeom prst="rect">
+            <a:avLst/>
+          </a:prstGeom>
+          <a:noFill/>
+        </p:spPr>
+        <p:txBody>
+          <a:bodyPr wrap="square" rtlCol="0">
+            <a:spAutoFit/>
+          </a:bodyPr>
+          <a:p>
+            <a:pPr algn="l"/>
+            <a:r>
+              <a:rPr lang="en-US" sz="1600" b="1">
+                <a:solidFill>
+                  <a:schemeClr val="accent5"/>
+                </a:solidFill>
+              </a:rPr>
+              <a:t>proportion to phi</a:t>
+            </a:r>
+            <a:endParaRPr lang="en-US" sz="1600" b="1">
+              <a:solidFill>
+                <a:schemeClr val="accent5"/>
+              </a:solidFill>
+            </a:endParaRPr>
+          </a:p>
+        </p:txBody>
+      </p:sp>
+      <p:sp>
+        <p:nvSpPr>
+          <p:cNvPr id="9" name="Text Box 8"/>
+          <p:cNvSpPr txBox="1"/>
+          <p:nvPr/>
+        </p:nvSpPr>
+        <p:spPr>
+          <a:xfrm>
+            <a:off x="7607935" y="3719830"/>
+            <a:ext cx="3207385" cy="337185"/>
+          </a:xfrm>
+          <a:prstGeom prst="rect">
+            <a:avLst/>
+          </a:prstGeom>
+          <a:noFill/>
+        </p:spPr>
+        <p:txBody>
+          <a:bodyPr wrap="square" rtlCol="0">
+            <a:spAutoFit/>
+          </a:bodyPr>
+          <a:p>
+            <a:pPr algn="l"/>
+            <a:r>
+              <a:rPr lang="en-US" sz="1600" b="1">
+                <a:solidFill>
+                  <a:schemeClr val="accent5"/>
+                </a:solidFill>
+              </a:rPr>
+              <a:t>proportion to i</a:t>
+            </a:r>
+            <a:endParaRPr lang="en-US" sz="1600" b="1">
+              <a:solidFill>
+                <a:schemeClr val="accent5"/>
+              </a:solidFill>
+            </a:endParaRPr>
+          </a:p>
+        </p:txBody>
+      </p:sp>
+      <p:cxnSp>
+        <p:nvCxnSpPr>
+          <p:cNvPr id="10" name="Straight Connector 9"/>
+          <p:cNvCxnSpPr/>
+          <p:nvPr/>
+        </p:nvCxnSpPr>
+        <p:spPr>
+          <a:xfrm flipV="1">
+            <a:off x="3071495" y="2075815"/>
+            <a:ext cx="2085975" cy="3650615"/>
+          </a:xfrm>
+          <a:prstGeom prst="line">
+            <a:avLst/>
+          </a:prstGeom>
+          <a:ln w="57150">
+            <a:gradFill>
+              <a:gsLst>
+                <a:gs pos="0">
+                  <a:srgbClr val="E30000"/>
+                </a:gs>
+                <a:gs pos="100000">
+                  <a:srgbClr val="760303"/>
+                </a:gs>
+              </a:gsLst>
+            </a:gradFill>
+            <a:prstDash val="dash"/>
+          </a:ln>
+        </p:spPr>
+        <p:style>
+          <a:lnRef idx="3">
+            <a:schemeClr val="accent2"/>
+          </a:lnRef>
+          <a:fillRef idx="0">
+            <a:schemeClr val="accent2"/>
+          </a:fillRef>
+          <a:effectRef idx="2">
+            <a:schemeClr val="accent2"/>
+          </a:effectRef>
+          <a:fontRef idx="minor">
+            <a:schemeClr val="tx1"/>
+          </a:fontRef>
+        </p:style>
+      </p:cxnSp>
+      <p:sp>
+        <p:nvSpPr>
+          <p:cNvPr id="11" name="Rectangles 10"/>
+          <p:cNvSpPr/>
+          <p:nvPr/>
+        </p:nvSpPr>
+        <p:spPr>
+          <a:xfrm>
+            <a:off x="2987040" y="1976755"/>
+            <a:ext cx="2185035" cy="3805555"/>
+          </a:xfrm>
+          <a:prstGeom prst="rect">
+            <a:avLst/>
+          </a:prstGeom>
+          <a:solidFill>
+            <a:srgbClr val="C00000">
+              <a:alpha val="20000"/>
+            </a:srgbClr>
+          </a:solidFill>
+        </p:spPr>
+        <p:style>
+          <a:lnRef idx="2">
+            <a:schemeClr val="accent1">
+              <a:shade val="50000"/>
+            </a:schemeClr>
+          </a:lnRef>
+          <a:fillRef idx="1">
+            <a:schemeClr val="accent1"/>
+          </a:fillRef>
+          <a:effectRef idx="0">
+            <a:schemeClr val="accent1"/>
+          </a:effectRef>
+          <a:fontRef idx="minor">
+            <a:schemeClr val="lt1"/>
+          </a:fontRef>
+        </p:style>
+        <p:txBody>
+          <a:bodyPr rtlCol="0" anchor="ctr"/>
+          <a:p>
+            <a:pPr algn="ctr"/>
+            <a:endParaRPr lang="en-US"/>
+          </a:p>
+        </p:txBody>
+      </p:sp>
+      <p:sp>
+        <p:nvSpPr>
+          <p:cNvPr id="12" name="Text Box 11"/>
+          <p:cNvSpPr txBox="1"/>
+          <p:nvPr/>
+        </p:nvSpPr>
+        <p:spPr>
+          <a:xfrm>
+            <a:off x="4159250" y="1484630"/>
+            <a:ext cx="614680" cy="337185"/>
+          </a:xfrm>
+          <a:prstGeom prst="rect">
+            <a:avLst/>
+          </a:prstGeom>
+          <a:noFill/>
+        </p:spPr>
+        <p:txBody>
+          <a:bodyPr wrap="square" rtlCol="0">
+            <a:spAutoFit/>
+          </a:bodyPr>
+          <a:p>
+            <a:pPr algn="l"/>
+            <a:r>
+              <a:rPr lang="en-US" sz="1600" b="1">
+                <a:solidFill>
+                  <a:srgbClr val="C00000"/>
+                </a:solidFill>
+              </a:rPr>
+              <a:t>K</a:t>
+            </a:r>
+            <a:r>
+              <a:rPr lang="en-US" sz="1600" b="1">
+                <a:solidFill>
+                  <a:srgbClr val="C00000"/>
+                </a:solidFill>
+                <a:latin typeface="Abyssinica SIL" panose="02000000000000000000" charset="0"/>
+                <a:cs typeface="Abyssinica SIL" panose="02000000000000000000" charset="0"/>
+              </a:rPr>
+              <a:t>∅</a:t>
+            </a:r>
+            <a:endParaRPr lang="en-US" sz="1600" b="1">
+              <a:solidFill>
+                <a:srgbClr val="C00000"/>
+              </a:solidFill>
+              <a:latin typeface="Abyssinica SIL" panose="02000000000000000000" charset="0"/>
+              <a:cs typeface="Abyssinica SIL" panose="02000000000000000000" charset="0"/>
+            </a:endParaRPr>
+          </a:p>
+        </p:txBody>
+      </p:sp>
+      <p:sp>
+        <p:nvSpPr>
+          <p:cNvPr id="13" name="Text Box 12"/>
+          <p:cNvSpPr txBox="1"/>
+          <p:nvPr/>
+        </p:nvSpPr>
+        <p:spPr>
+          <a:xfrm>
+            <a:off x="6394450" y="3520440"/>
+            <a:ext cx="614680" cy="337185"/>
+          </a:xfrm>
+          <a:prstGeom prst="rect">
+            <a:avLst/>
+          </a:prstGeom>
+          <a:noFill/>
+        </p:spPr>
+        <p:txBody>
+          <a:bodyPr wrap="square" rtlCol="0">
+            <a:spAutoFit/>
+          </a:bodyPr>
+          <a:p>
+            <a:pPr algn="l"/>
+            <a:r>
+              <a:rPr lang="en-US" sz="1600" b="1">
+                <a:solidFill>
+                  <a:srgbClr val="C00000"/>
+                </a:solidFill>
+              </a:rPr>
+              <a:t>i</a:t>
+            </a:r>
+            <a:r>
+              <a:rPr lang="en-US" sz="1600" b="1" baseline="-25000">
+                <a:solidFill>
+                  <a:srgbClr val="C00000"/>
+                </a:solidFill>
+              </a:rPr>
+              <a:t>f</a:t>
+            </a:r>
+            <a:endParaRPr lang="en-US" sz="1600" b="1" baseline="-25000">
+              <a:solidFill>
+                <a:srgbClr val="C00000"/>
+              </a:solidFill>
+              <a:latin typeface="Abyssinica SIL" panose="02000000000000000000" charset="0"/>
+              <a:cs typeface="Abyssinica SIL" panose="02000000000000000000" charset="0"/>
+            </a:endParaRPr>
+          </a:p>
+        </p:txBody>
+      </p:sp>
+      <p:sp>
+        <p:nvSpPr>
+          <p:cNvPr id="14" name="Text Box 13"/>
+          <p:cNvSpPr txBox="1"/>
+          <p:nvPr/>
+        </p:nvSpPr>
+        <p:spPr>
+          <a:xfrm>
+            <a:off x="4457700" y="3183255"/>
+            <a:ext cx="614680" cy="337185"/>
+          </a:xfrm>
+          <a:prstGeom prst="rect">
+            <a:avLst/>
+          </a:prstGeom>
+          <a:noFill/>
+        </p:spPr>
+        <p:txBody>
+          <a:bodyPr wrap="square" rtlCol="0">
+            <a:spAutoFit/>
+          </a:bodyPr>
+          <a:p>
+            <a:pPr algn="l"/>
+            <a:r>
+              <a:rPr lang="en-US" sz="1600" b="1">
+                <a:solidFill>
+                  <a:srgbClr val="C00000"/>
+                </a:solidFill>
+              </a:rPr>
+              <a:t>K</a:t>
+            </a:r>
+            <a:r>
+              <a:rPr lang="en-US" sz="1600" b="1" baseline="-25000">
+                <a:solidFill>
+                  <a:srgbClr val="C00000"/>
+                </a:solidFill>
+              </a:rPr>
+              <a:t>f</a:t>
+            </a:r>
+            <a:endParaRPr lang="en-US" sz="1600" b="1" baseline="-25000">
+              <a:solidFill>
+                <a:srgbClr val="C00000"/>
+              </a:solidFill>
+              <a:latin typeface="Abyssinica SIL" panose="02000000000000000000" charset="0"/>
+              <a:cs typeface="Abyssinica SIL" panose="02000000000000000000" charset="0"/>
+            </a:endParaRPr>
+          </a:p>
+        </p:txBody>
+      </p:sp>
+      <p:sp>
+        <p:nvSpPr>
+          <p:cNvPr id="15" name="Text Box 14"/>
+          <p:cNvSpPr txBox="1"/>
+          <p:nvPr/>
+        </p:nvSpPr>
+        <p:spPr>
+          <a:xfrm>
+            <a:off x="7009130" y="4768850"/>
+            <a:ext cx="2206625" cy="460375"/>
+          </a:xfrm>
+          <a:prstGeom prst="rect">
+            <a:avLst/>
+          </a:prstGeom>
+          <a:noFill/>
+        </p:spPr>
+        <p:txBody>
+          <a:bodyPr wrap="square" rtlCol="0">
+            <a:spAutoFit/>
+          </a:bodyPr>
+          <a:p>
+            <a:pPr algn="l"/>
+            <a:r>
+              <a:rPr lang="en-US" sz="2400" b="1">
+                <a:solidFill>
+                  <a:srgbClr val="C00000"/>
+                </a:solidFill>
+              </a:rPr>
+              <a:t>K</a:t>
+            </a:r>
+            <a:r>
+              <a:rPr lang="en-US" sz="2400" b="1">
+                <a:solidFill>
+                  <a:srgbClr val="C00000"/>
+                </a:solidFill>
+                <a:latin typeface="Abyssinica SIL" panose="02000000000000000000" charset="0"/>
+                <a:cs typeface="Abyssinica SIL" panose="02000000000000000000" charset="0"/>
+              </a:rPr>
+              <a:t>∅ = </a:t>
+            </a:r>
+            <a:r>
+              <a:rPr lang="en-US" sz="2400" b="1">
+                <a:solidFill>
+                  <a:srgbClr val="C00000"/>
+                </a:solidFill>
+                <a:sym typeface="+mn-ea"/>
+              </a:rPr>
+              <a:t>K</a:t>
+            </a:r>
+            <a:r>
+              <a:rPr lang="en-US" sz="2400" b="1" baseline="-25000">
+                <a:solidFill>
+                  <a:srgbClr val="C00000"/>
+                </a:solidFill>
+                <a:sym typeface="+mn-ea"/>
+              </a:rPr>
+              <a:t>f</a:t>
+            </a:r>
+            <a:r>
+              <a:rPr lang="en-US" sz="2400" b="1">
+                <a:solidFill>
+                  <a:srgbClr val="C00000"/>
+                </a:solidFill>
+                <a:sym typeface="+mn-ea"/>
+              </a:rPr>
+              <a:t>i</a:t>
+            </a:r>
+            <a:r>
+              <a:rPr lang="en-US" sz="2400" b="1" baseline="-25000">
+                <a:solidFill>
+                  <a:srgbClr val="C00000"/>
+                </a:solidFill>
+                <a:sym typeface="+mn-ea"/>
+              </a:rPr>
+              <a:t>f</a:t>
+            </a:r>
+            <a:endParaRPr lang="en-US" sz="2400" b="1" baseline="-25000">
+              <a:solidFill>
+                <a:srgbClr val="C00000"/>
+              </a:solidFill>
+              <a:latin typeface="Abyssinica SIL" panose="02000000000000000000" charset="0"/>
+              <a:cs typeface="Abyssinica SIL" panose="02000000000000000000" charset="0"/>
+              <a:sym typeface="+mn-ea"/>
+            </a:endParaRPr>
+          </a:p>
+        </p:txBody>
+      </p:sp>
+    </p:spTree>
+  </p:cSld>
+  <p:clrMapOvr>
+    <a:masterClrMapping/>
+  </p:clrMapOvr>
+</p:sld>
+</file>
+
 <file path=ppt/slides/slide2.xml><?xml version="1.0" encoding="utf-8"?>
 <p:sld xmlns:a="http://schemas.openxmlformats.org/drawingml/2006/main" xmlns:r="http://schemas.openxmlformats.org/officeDocument/2006/relationships" xmlns:p="http://schemas.openxmlformats.org/presentationml/2006/main">
   <p:cSld>

</xml_diff>